<commit_message>
Se mejora presentacion de la base de datos y se corrigen algunos comentarios de graficos
</commit_message>
<xml_diff>
--- a/Online retail.pptx
+++ b/Online retail.pptx
@@ -10,29 +10,39 @@
     <p:sldId id="266" r:id="rId4"/>
     <p:sldId id="257" r:id="rId5"/>
     <p:sldId id="267" r:id="rId6"/>
-    <p:sldId id="268" r:id="rId7"/>
-    <p:sldId id="286" r:id="rId8"/>
-    <p:sldId id="287" r:id="rId9"/>
-    <p:sldId id="261" r:id="rId10"/>
-    <p:sldId id="262" r:id="rId11"/>
-    <p:sldId id="263" r:id="rId12"/>
-    <p:sldId id="269" r:id="rId13"/>
-    <p:sldId id="264" r:id="rId14"/>
-    <p:sldId id="265" r:id="rId15"/>
-    <p:sldId id="270" r:id="rId16"/>
-    <p:sldId id="271" r:id="rId17"/>
-    <p:sldId id="272" r:id="rId18"/>
-    <p:sldId id="273" r:id="rId19"/>
-    <p:sldId id="274" r:id="rId20"/>
-    <p:sldId id="275" r:id="rId21"/>
-    <p:sldId id="277" r:id="rId22"/>
-    <p:sldId id="278" r:id="rId23"/>
-    <p:sldId id="288" r:id="rId24"/>
-    <p:sldId id="279" r:id="rId25"/>
-    <p:sldId id="280" r:id="rId26"/>
-    <p:sldId id="283" r:id="rId27"/>
-    <p:sldId id="281" r:id="rId28"/>
-    <p:sldId id="289" r:id="rId29"/>
+    <p:sldId id="290" r:id="rId7"/>
+    <p:sldId id="268" r:id="rId8"/>
+    <p:sldId id="286" r:id="rId9"/>
+    <p:sldId id="287" r:id="rId10"/>
+    <p:sldId id="261" r:id="rId11"/>
+    <p:sldId id="262" r:id="rId12"/>
+    <p:sldId id="263" r:id="rId13"/>
+    <p:sldId id="269" r:id="rId14"/>
+    <p:sldId id="291" r:id="rId15"/>
+    <p:sldId id="264" r:id="rId16"/>
+    <p:sldId id="265" r:id="rId17"/>
+    <p:sldId id="270" r:id="rId18"/>
+    <p:sldId id="271" r:id="rId19"/>
+    <p:sldId id="272" r:id="rId20"/>
+    <p:sldId id="292" r:id="rId21"/>
+    <p:sldId id="273" r:id="rId22"/>
+    <p:sldId id="293" r:id="rId23"/>
+    <p:sldId id="274" r:id="rId24"/>
+    <p:sldId id="275" r:id="rId25"/>
+    <p:sldId id="277" r:id="rId26"/>
+    <p:sldId id="294" r:id="rId27"/>
+    <p:sldId id="278" r:id="rId28"/>
+    <p:sldId id="295" r:id="rId29"/>
+    <p:sldId id="288" r:id="rId30"/>
+    <p:sldId id="296" r:id="rId31"/>
+    <p:sldId id="279" r:id="rId32"/>
+    <p:sldId id="280" r:id="rId33"/>
+    <p:sldId id="283" r:id="rId34"/>
+    <p:sldId id="281" r:id="rId35"/>
+    <p:sldId id="297" r:id="rId36"/>
+    <p:sldId id="289" r:id="rId37"/>
+    <p:sldId id="298" r:id="rId38"/>
+    <p:sldId id="299" r:id="rId39"/>
   </p:sldIdLst>
   <p:sldSz cx="12192000" cy="6858000"/>
   <p:notesSz cx="6858000" cy="9144000"/>
@@ -1300,7 +1310,7 @@
           <a:p>
             <a:fld id="{81AD4563-DB8A-419E-AB44-7878E38B1578}" type="datetimeFigureOut">
               <a:rPr lang="es-CL" smtClean="0"/>
-              <a:t>19-09-2021</a:t>
+              <a:t>26-09-2021</a:t>
             </a:fld>
             <a:endParaRPr lang="es-CL"/>
           </a:p>
@@ -1500,7 +1510,7 @@
           <a:p>
             <a:fld id="{81AD4563-DB8A-419E-AB44-7878E38B1578}" type="datetimeFigureOut">
               <a:rPr lang="es-CL" smtClean="0"/>
-              <a:t>19-09-2021</a:t>
+              <a:t>26-09-2021</a:t>
             </a:fld>
             <a:endParaRPr lang="es-CL"/>
           </a:p>
@@ -10924,6 +10934,34 @@
           </a:p>
         </p:txBody>
       </p:sp>
+      <p:sp>
+        <p:nvSpPr>
+          <p:cNvPr id="3" name="Subtítulo 2">
+            <a:extLst>
+              <a:ext uri="{FF2B5EF4-FFF2-40B4-BE49-F238E27FC236}">
+                <a16:creationId xmlns:a16="http://schemas.microsoft.com/office/drawing/2014/main" id="{79CC1B97-77C8-420D-AA82-B6E5B391FE68}"/>
+              </a:ext>
+            </a:extLst>
+          </p:cNvPr>
+          <p:cNvSpPr>
+            <a:spLocks noGrp="1"/>
+          </p:cNvSpPr>
+          <p:nvPr>
+            <p:ph type="subTitle" idx="1"/>
+          </p:nvPr>
+        </p:nvSpPr>
+        <p:spPr/>
+        <p:txBody>
+          <a:bodyPr/>
+          <a:lstStyle/>
+          <a:p>
+            <a:r>
+              <a:rPr lang="es-CL" dirty="0"/>
+              <a:t>Cristóbal Saldías Rojas</a:t>
+            </a:r>
+          </a:p>
+        </p:txBody>
+      </p:sp>
     </p:spTree>
     <p:extLst>
       <p:ext uri="{BB962C8B-B14F-4D97-AF65-F5344CB8AC3E}">
@@ -10938,6 +10976,128 @@
 </file>
 
 <file path=ppt/slides/slide10.xml><?xml version="1.0" encoding="utf-8"?>
+<p:sld xmlns:a="http://schemas.openxmlformats.org/drawingml/2006/main" xmlns:r="http://schemas.openxmlformats.org/officeDocument/2006/relationships" xmlns:p="http://schemas.openxmlformats.org/presentationml/2006/main">
+  <p:cSld>
+    <p:spTree>
+      <p:nvGrpSpPr>
+        <p:cNvPr id="1" name=""/>
+        <p:cNvGrpSpPr/>
+        <p:nvPr/>
+      </p:nvGrpSpPr>
+      <p:grpSpPr>
+        <a:xfrm>
+          <a:off x="0" y="0"/>
+          <a:ext cx="0" cy="0"/>
+          <a:chOff x="0" y="0"/>
+          <a:chExt cx="0" cy="0"/>
+        </a:xfrm>
+      </p:grpSpPr>
+      <p:sp>
+        <p:nvSpPr>
+          <p:cNvPr id="2" name="Título 1">
+            <a:extLst>
+              <a:ext uri="{FF2B5EF4-FFF2-40B4-BE49-F238E27FC236}">
+                <a16:creationId xmlns:a16="http://schemas.microsoft.com/office/drawing/2014/main" id="{090112C1-E192-4965-B37D-8B02D3777E1D}"/>
+              </a:ext>
+            </a:extLst>
+          </p:cNvPr>
+          <p:cNvSpPr>
+            <a:spLocks noGrp="1"/>
+          </p:cNvSpPr>
+          <p:nvPr>
+            <p:ph type="title"/>
+          </p:nvPr>
+        </p:nvSpPr>
+        <p:spPr/>
+        <p:txBody>
+          <a:bodyPr/>
+          <a:lstStyle/>
+          <a:p>
+            <a:r>
+              <a:rPr lang="es-CL" dirty="0"/>
+              <a:t>RFM</a:t>
+            </a:r>
+          </a:p>
+        </p:txBody>
+      </p:sp>
+      <p:sp>
+        <p:nvSpPr>
+          <p:cNvPr id="3" name="Marcador de contenido 2">
+            <a:extLst>
+              <a:ext uri="{FF2B5EF4-FFF2-40B4-BE49-F238E27FC236}">
+                <a16:creationId xmlns:a16="http://schemas.microsoft.com/office/drawing/2014/main" id="{CE837E54-5849-4135-9811-99364256D384}"/>
+              </a:ext>
+            </a:extLst>
+          </p:cNvPr>
+          <p:cNvSpPr>
+            <a:spLocks noGrp="1"/>
+          </p:cNvSpPr>
+          <p:nvPr>
+            <p:ph type="body" idx="1"/>
+          </p:nvPr>
+        </p:nvSpPr>
+        <p:spPr/>
+        <p:txBody>
+          <a:bodyPr/>
+          <a:lstStyle/>
+          <a:p>
+            <a:r>
+              <a:rPr lang="es-CL" sz="2400" dirty="0"/>
+              <a:t>Para analizar la frecuencia y recencia de compra, se realizó una segmentación RFM.</a:t>
+            </a:r>
+          </a:p>
+          <a:p>
+            <a:r>
+              <a:rPr lang="es-CL" sz="2400" dirty="0"/>
+              <a:t>Su nombre proviene de sus siglas en inglés:</a:t>
+            </a:r>
+          </a:p>
+          <a:p>
+            <a:pPr lvl="1"/>
+            <a:r>
+              <a:rPr lang="es-CL" sz="1800" dirty="0" err="1"/>
+              <a:t>Recency</a:t>
+            </a:r>
+            <a:endParaRPr lang="es-CL" sz="1800" dirty="0"/>
+          </a:p>
+          <a:p>
+            <a:pPr lvl="1"/>
+            <a:r>
+              <a:rPr lang="es-CL" sz="1800" dirty="0" err="1"/>
+              <a:t>Frecuency</a:t>
+            </a:r>
+            <a:endParaRPr lang="es-CL" sz="1800" dirty="0"/>
+          </a:p>
+          <a:p>
+            <a:pPr lvl="1"/>
+            <a:r>
+              <a:rPr lang="es-CL" sz="1800" dirty="0" err="1"/>
+              <a:t>Monetary</a:t>
+            </a:r>
+            <a:endParaRPr lang="es-CL" sz="1800" dirty="0"/>
+          </a:p>
+          <a:p>
+            <a:r>
+              <a:rPr lang="es-CL" sz="2400" dirty="0"/>
+              <a:t>Se basa en que, el 80% de los ingresos proviene del 20% de los clientes.</a:t>
+            </a:r>
+          </a:p>
+        </p:txBody>
+      </p:sp>
+    </p:spTree>
+    <p:extLst>
+      <p:ext uri="{BB962C8B-B14F-4D97-AF65-F5344CB8AC3E}">
+        <p14:creationId xmlns:p14="http://schemas.microsoft.com/office/powerpoint/2010/main" val="3930673792"/>
+      </p:ext>
+    </p:extLst>
+  </p:cSld>
+  <p:clrMapOvr>
+    <a:masterClrMapping/>
+  </p:clrMapOvr>
+</p:sld>
+</file>
+
+<file path=ppt/slides/slide11.xml><?xml version="1.0" encoding="utf-8"?>
 <p:sld xmlns:a="http://schemas.openxmlformats.org/drawingml/2006/main" xmlns:r="http://schemas.openxmlformats.org/officeDocument/2006/relationships" xmlns:p="http://schemas.openxmlformats.org/presentationml/2006/main">
   <p:cSld>
     <p:spTree>
@@ -11047,7 +11207,7 @@
 </p:sld>
 </file>
 
-<file path=ppt/slides/slide11.xml><?xml version="1.0" encoding="utf-8"?>
+<file path=ppt/slides/slide12.xml><?xml version="1.0" encoding="utf-8"?>
 <p:sld xmlns:a="http://schemas.openxmlformats.org/drawingml/2006/main" xmlns:r="http://schemas.openxmlformats.org/officeDocument/2006/relationships" xmlns:p="http://schemas.openxmlformats.org/presentationml/2006/main">
   <p:cSld>
     <p:spTree>
@@ -11163,7 +11323,7 @@
 </p:sld>
 </file>
 
-<file path=ppt/slides/slide12.xml><?xml version="1.0" encoding="utf-8"?>
+<file path=ppt/slides/slide13.xml><?xml version="1.0" encoding="utf-8"?>
 <p:sld xmlns:a="http://schemas.openxmlformats.org/drawingml/2006/main" xmlns:r="http://schemas.openxmlformats.org/officeDocument/2006/relationships" xmlns:p="http://schemas.openxmlformats.org/presentationml/2006/main">
   <p:cSld>
     <p:spTree>
@@ -11261,7 +11421,136 @@
 </p:sld>
 </file>
 
-<file path=ppt/slides/slide13.xml><?xml version="1.0" encoding="utf-8"?>
+<file path=ppt/slides/slide14.xml><?xml version="1.0" encoding="utf-8"?>
+<p:sld xmlns:a="http://schemas.openxmlformats.org/drawingml/2006/main" xmlns:r="http://schemas.openxmlformats.org/officeDocument/2006/relationships" xmlns:p="http://schemas.openxmlformats.org/presentationml/2006/main">
+  <p:cSld>
+    <p:spTree>
+      <p:nvGrpSpPr>
+        <p:cNvPr id="1" name=""/>
+        <p:cNvGrpSpPr/>
+        <p:nvPr/>
+      </p:nvGrpSpPr>
+      <p:grpSpPr>
+        <a:xfrm>
+          <a:off x="0" y="0"/>
+          <a:ext cx="0" cy="0"/>
+          <a:chOff x="0" y="0"/>
+          <a:chExt cx="0" cy="0"/>
+        </a:xfrm>
+      </p:grpSpPr>
+      <p:sp>
+        <p:nvSpPr>
+          <p:cNvPr id="2" name="Título 1">
+            <a:extLst>
+              <a:ext uri="{FF2B5EF4-FFF2-40B4-BE49-F238E27FC236}">
+                <a16:creationId xmlns:a16="http://schemas.microsoft.com/office/drawing/2014/main" id="{14180B7E-E960-423F-8496-2E4E4F96B770}"/>
+              </a:ext>
+            </a:extLst>
+          </p:cNvPr>
+          <p:cNvSpPr>
+            <a:spLocks noGrp="1"/>
+          </p:cNvSpPr>
+          <p:nvPr>
+            <p:ph type="title"/>
+          </p:nvPr>
+        </p:nvSpPr>
+        <p:spPr/>
+        <p:txBody>
+          <a:bodyPr/>
+          <a:lstStyle/>
+          <a:p>
+            <a:r>
+              <a:rPr lang="es-CL" dirty="0"/>
+              <a:t>Recencia de clientes</a:t>
+            </a:r>
+          </a:p>
+        </p:txBody>
+      </p:sp>
+      <p:sp>
+        <p:nvSpPr>
+          <p:cNvPr id="3" name="Marcador de texto 2">
+            <a:extLst>
+              <a:ext uri="{FF2B5EF4-FFF2-40B4-BE49-F238E27FC236}">
+                <a16:creationId xmlns:a16="http://schemas.microsoft.com/office/drawing/2014/main" id="{EEE5BE7A-034B-4B55-B34E-0AA4B76EA465}"/>
+              </a:ext>
+            </a:extLst>
+          </p:cNvPr>
+          <p:cNvSpPr>
+            <a:spLocks noGrp="1"/>
+          </p:cNvSpPr>
+          <p:nvPr>
+            <p:ph type="body" idx="1"/>
+          </p:nvPr>
+        </p:nvSpPr>
+        <p:spPr/>
+        <p:txBody>
+          <a:bodyPr/>
+          <a:lstStyle/>
+          <a:p>
+            <a:r>
+              <a:rPr lang="es-CL" b="0" dirty="0">
+                <a:solidFill>
+                  <a:srgbClr val="000000"/>
+                </a:solidFill>
+                <a:effectLst/>
+              </a:rPr>
+              <a:t>Hay un gran volumen de usuarios que posee entre 0 y 50 días de recencia. Después se observa un claro descenso de esto, exceptuando por la última categoría, que serían los usuarios con una recencia mayor a 350 días. </a:t>
+            </a:r>
+          </a:p>
+          <a:p>
+            <a:r>
+              <a:rPr lang="es-CL" dirty="0">
+                <a:solidFill>
+                  <a:srgbClr val="000000"/>
+                </a:solidFill>
+              </a:rPr>
+              <a:t>E</a:t>
+            </a:r>
+            <a:r>
+              <a:rPr lang="es-CL" b="0" dirty="0">
+                <a:solidFill>
+                  <a:srgbClr val="000000"/>
+                </a:solidFill>
+                <a:effectLst/>
+              </a:rPr>
+              <a:t>xiste un cierto número de registros </a:t>
+            </a:r>
+            <a:r>
+              <a:rPr lang="es-CL" b="0" dirty="0" err="1">
+                <a:solidFill>
+                  <a:srgbClr val="000000"/>
+                </a:solidFill>
+                <a:effectLst/>
+              </a:rPr>
+              <a:t>outliers</a:t>
+            </a:r>
+            <a:r>
+              <a:rPr lang="es-CL" b="0" dirty="0">
+                <a:solidFill>
+                  <a:srgbClr val="000000"/>
+                </a:solidFill>
+                <a:effectLst/>
+              </a:rPr>
+              <a:t> que están por sobre los 326 días de recencia, para ser exactos, corresponden a 155 clientes.</a:t>
+            </a:r>
+            <a:endParaRPr lang="es-CL" dirty="0"/>
+          </a:p>
+        </p:txBody>
+      </p:sp>
+    </p:spTree>
+    <p:extLst>
+      <p:ext uri="{BB962C8B-B14F-4D97-AF65-F5344CB8AC3E}">
+        <p14:creationId xmlns:p14="http://schemas.microsoft.com/office/powerpoint/2010/main" val="379058219"/>
+      </p:ext>
+    </p:extLst>
+  </p:cSld>
+  <p:clrMapOvr>
+    <a:masterClrMapping/>
+  </p:clrMapOvr>
+</p:sld>
+</file>
+
+<file path=ppt/slides/slide15.xml><?xml version="1.0" encoding="utf-8"?>
 <p:sld xmlns:a="http://schemas.openxmlformats.org/drawingml/2006/main" xmlns:r="http://schemas.openxmlformats.org/officeDocument/2006/relationships" xmlns:p="http://schemas.openxmlformats.org/presentationml/2006/main">
   <p:cSld>
     <p:spTree>
@@ -11382,192 +11671,6 @@
 </p:sld>
 </file>
 
-<file path=ppt/slides/slide14.xml><?xml version="1.0" encoding="utf-8"?>
-<p:sld xmlns:a="http://schemas.openxmlformats.org/drawingml/2006/main" xmlns:r="http://schemas.openxmlformats.org/officeDocument/2006/relationships" xmlns:p="http://schemas.openxmlformats.org/presentationml/2006/main">
-  <p:cSld>
-    <p:spTree>
-      <p:nvGrpSpPr>
-        <p:cNvPr id="1" name=""/>
-        <p:cNvGrpSpPr/>
-        <p:nvPr/>
-      </p:nvGrpSpPr>
-      <p:grpSpPr>
-        <a:xfrm>
-          <a:off x="0" y="0"/>
-          <a:ext cx="0" cy="0"/>
-          <a:chOff x="0" y="0"/>
-          <a:chExt cx="0" cy="0"/>
-        </a:xfrm>
-      </p:grpSpPr>
-      <p:sp>
-        <p:nvSpPr>
-          <p:cNvPr id="4" name="Título 3">
-            <a:extLst>
-              <a:ext uri="{FF2B5EF4-FFF2-40B4-BE49-F238E27FC236}">
-                <a16:creationId xmlns:a16="http://schemas.microsoft.com/office/drawing/2014/main" id="{F4AC31E8-7761-4B38-920A-C85DC9B035C0}"/>
-              </a:ext>
-            </a:extLst>
-          </p:cNvPr>
-          <p:cNvSpPr>
-            <a:spLocks noGrp="1"/>
-          </p:cNvSpPr>
-          <p:nvPr>
-            <p:ph type="title"/>
-          </p:nvPr>
-        </p:nvSpPr>
-        <p:spPr/>
-        <p:txBody>
-          <a:bodyPr/>
-          <a:lstStyle/>
-          <a:p>
-            <a:r>
-              <a:rPr lang="es-CL" dirty="0"/>
-              <a:t>Descripción de cada tipo de cliente en base a RFM</a:t>
-            </a:r>
-          </a:p>
-        </p:txBody>
-      </p:sp>
-      <p:sp>
-        <p:nvSpPr>
-          <p:cNvPr id="5" name="Marcador de texto 4">
-            <a:extLst>
-              <a:ext uri="{FF2B5EF4-FFF2-40B4-BE49-F238E27FC236}">
-                <a16:creationId xmlns:a16="http://schemas.microsoft.com/office/drawing/2014/main" id="{FC7D91EF-0396-41A0-8BB5-6ADB878EB767}"/>
-              </a:ext>
-            </a:extLst>
-          </p:cNvPr>
-          <p:cNvSpPr>
-            <a:spLocks noGrp="1"/>
-          </p:cNvSpPr>
-          <p:nvPr>
-            <p:ph type="body" idx="1"/>
-          </p:nvPr>
-        </p:nvSpPr>
-        <p:spPr/>
-        <p:txBody>
-          <a:bodyPr/>
-          <a:lstStyle/>
-          <a:p>
-            <a:r>
-              <a:rPr lang="es-CL" dirty="0"/>
-              <a:t>Clientes de frecuencia promedio:</a:t>
-            </a:r>
-          </a:p>
-          <a:p>
-            <a:pPr lvl="1"/>
-            <a:r>
-              <a:rPr lang="es-CL" dirty="0"/>
-              <a:t>Corresponde al cliente de frecuencia promedio, tiende a tener un nivel de recencia alto, o sea, que han pasado varios días desde su última visita. El consumo de productos que realiza, al igual que la frecuencia, tiende a ser promedio.</a:t>
-            </a:r>
-          </a:p>
-        </p:txBody>
-      </p:sp>
-    </p:spTree>
-    <p:extLst>
-      <p:ext uri="{BB962C8B-B14F-4D97-AF65-F5344CB8AC3E}">
-        <p14:creationId xmlns:p14="http://schemas.microsoft.com/office/powerpoint/2010/main" val="4150490007"/>
-      </p:ext>
-    </p:extLst>
-  </p:cSld>
-  <p:clrMapOvr>
-    <a:masterClrMapping/>
-  </p:clrMapOvr>
-</p:sld>
-</file>
-
-<file path=ppt/slides/slide15.xml><?xml version="1.0" encoding="utf-8"?>
-<p:sld xmlns:a="http://schemas.openxmlformats.org/drawingml/2006/main" xmlns:r="http://schemas.openxmlformats.org/officeDocument/2006/relationships" xmlns:p="http://schemas.openxmlformats.org/presentationml/2006/main">
-  <p:cSld>
-    <p:spTree>
-      <p:nvGrpSpPr>
-        <p:cNvPr id="1" name=""/>
-        <p:cNvGrpSpPr/>
-        <p:nvPr/>
-      </p:nvGrpSpPr>
-      <p:grpSpPr>
-        <a:xfrm>
-          <a:off x="0" y="0"/>
-          <a:ext cx="0" cy="0"/>
-          <a:chOff x="0" y="0"/>
-          <a:chExt cx="0" cy="0"/>
-        </a:xfrm>
-      </p:grpSpPr>
-      <p:sp>
-        <p:nvSpPr>
-          <p:cNvPr id="4" name="Título 3">
-            <a:extLst>
-              <a:ext uri="{FF2B5EF4-FFF2-40B4-BE49-F238E27FC236}">
-                <a16:creationId xmlns:a16="http://schemas.microsoft.com/office/drawing/2014/main" id="{F4AC31E8-7761-4B38-920A-C85DC9B035C0}"/>
-              </a:ext>
-            </a:extLst>
-          </p:cNvPr>
-          <p:cNvSpPr>
-            <a:spLocks noGrp="1"/>
-          </p:cNvSpPr>
-          <p:nvPr>
-            <p:ph type="title"/>
-          </p:nvPr>
-        </p:nvSpPr>
-        <p:spPr/>
-        <p:txBody>
-          <a:bodyPr/>
-          <a:lstStyle/>
-          <a:p>
-            <a:r>
-              <a:rPr lang="es-CL" dirty="0"/>
-              <a:t>Características de cada tipo de cliente</a:t>
-            </a:r>
-          </a:p>
-        </p:txBody>
-      </p:sp>
-      <p:sp>
-        <p:nvSpPr>
-          <p:cNvPr id="5" name="Marcador de texto 4">
-            <a:extLst>
-              <a:ext uri="{FF2B5EF4-FFF2-40B4-BE49-F238E27FC236}">
-                <a16:creationId xmlns:a16="http://schemas.microsoft.com/office/drawing/2014/main" id="{FC7D91EF-0396-41A0-8BB5-6ADB878EB767}"/>
-              </a:ext>
-            </a:extLst>
-          </p:cNvPr>
-          <p:cNvSpPr>
-            <a:spLocks noGrp="1"/>
-          </p:cNvSpPr>
-          <p:nvPr>
-            <p:ph type="body" idx="1"/>
-          </p:nvPr>
-        </p:nvSpPr>
-        <p:spPr/>
-        <p:txBody>
-          <a:bodyPr/>
-          <a:lstStyle/>
-          <a:p>
-            <a:r>
-              <a:rPr lang="es-CL" dirty="0"/>
-              <a:t>Clientes de alta frecuencia:</a:t>
-            </a:r>
-          </a:p>
-          <a:p>
-            <a:pPr lvl="1"/>
-            <a:r>
-              <a:rPr lang="es-CL" dirty="0"/>
-              <a:t>Corresponde a clientes que, además de tener una alta frecuencia de compra, poseen un alto gasto en compras; pero estos son un grupo bastante minoritario comparado al anterior. En cuanto al nivel de recencia, éste tiende a ser mayor al de los clientes de frecuencia promedio.</a:t>
-            </a:r>
-          </a:p>
-        </p:txBody>
-      </p:sp>
-    </p:spTree>
-    <p:extLst>
-      <p:ext uri="{BB962C8B-B14F-4D97-AF65-F5344CB8AC3E}">
-        <p14:creationId xmlns:p14="http://schemas.microsoft.com/office/powerpoint/2010/main" val="1562687978"/>
-      </p:ext>
-    </p:extLst>
-  </p:cSld>
-  <p:clrMapOvr>
-    <a:masterClrMapping/>
-  </p:clrMapOvr>
-</p:sld>
-</file>
-
 <file path=ppt/slides/slide16.xml><?xml version="1.0" encoding="utf-8"?>
 <p:sld xmlns:a="http://schemas.openxmlformats.org/drawingml/2006/main" xmlns:r="http://schemas.openxmlformats.org/officeDocument/2006/relationships" xmlns:p="http://schemas.openxmlformats.org/presentationml/2006/main">
   <p:cSld>
@@ -11608,7 +11711,7 @@
           <a:p>
             <a:r>
               <a:rPr lang="es-CL" dirty="0"/>
-              <a:t>Características de cada tipo de cliente</a:t>
+              <a:t>Descripción de cada tipo de cliente en base a RFM</a:t>
             </a:r>
           </a:p>
         </p:txBody>
@@ -11636,6 +11739,192 @@
           <a:p>
             <a:r>
               <a:rPr lang="es-CL" dirty="0"/>
+              <a:t>Clientes de frecuencia promedio:</a:t>
+            </a:r>
+          </a:p>
+          <a:p>
+            <a:pPr lvl="1"/>
+            <a:r>
+              <a:rPr lang="es-CL" dirty="0"/>
+              <a:t>Corresponde al cliente de frecuencia promedio, tiende a tener un nivel de recencia alto, o sea, que han pasado varios días desde su última visita. El consumo de productos que realiza, al igual que la frecuencia, tiende a ser promedio.</a:t>
+            </a:r>
+          </a:p>
+        </p:txBody>
+      </p:sp>
+    </p:spTree>
+    <p:extLst>
+      <p:ext uri="{BB962C8B-B14F-4D97-AF65-F5344CB8AC3E}">
+        <p14:creationId xmlns:p14="http://schemas.microsoft.com/office/powerpoint/2010/main" val="4150490007"/>
+      </p:ext>
+    </p:extLst>
+  </p:cSld>
+  <p:clrMapOvr>
+    <a:masterClrMapping/>
+  </p:clrMapOvr>
+</p:sld>
+</file>
+
+<file path=ppt/slides/slide17.xml><?xml version="1.0" encoding="utf-8"?>
+<p:sld xmlns:a="http://schemas.openxmlformats.org/drawingml/2006/main" xmlns:r="http://schemas.openxmlformats.org/officeDocument/2006/relationships" xmlns:p="http://schemas.openxmlformats.org/presentationml/2006/main">
+  <p:cSld>
+    <p:spTree>
+      <p:nvGrpSpPr>
+        <p:cNvPr id="1" name=""/>
+        <p:cNvGrpSpPr/>
+        <p:nvPr/>
+      </p:nvGrpSpPr>
+      <p:grpSpPr>
+        <a:xfrm>
+          <a:off x="0" y="0"/>
+          <a:ext cx="0" cy="0"/>
+          <a:chOff x="0" y="0"/>
+          <a:chExt cx="0" cy="0"/>
+        </a:xfrm>
+      </p:grpSpPr>
+      <p:sp>
+        <p:nvSpPr>
+          <p:cNvPr id="4" name="Título 3">
+            <a:extLst>
+              <a:ext uri="{FF2B5EF4-FFF2-40B4-BE49-F238E27FC236}">
+                <a16:creationId xmlns:a16="http://schemas.microsoft.com/office/drawing/2014/main" id="{F4AC31E8-7761-4B38-920A-C85DC9B035C0}"/>
+              </a:ext>
+            </a:extLst>
+          </p:cNvPr>
+          <p:cNvSpPr>
+            <a:spLocks noGrp="1"/>
+          </p:cNvSpPr>
+          <p:nvPr>
+            <p:ph type="title"/>
+          </p:nvPr>
+        </p:nvSpPr>
+        <p:spPr/>
+        <p:txBody>
+          <a:bodyPr/>
+          <a:lstStyle/>
+          <a:p>
+            <a:r>
+              <a:rPr lang="es-CL" dirty="0"/>
+              <a:t>Características de cada tipo de cliente</a:t>
+            </a:r>
+          </a:p>
+        </p:txBody>
+      </p:sp>
+      <p:sp>
+        <p:nvSpPr>
+          <p:cNvPr id="5" name="Marcador de texto 4">
+            <a:extLst>
+              <a:ext uri="{FF2B5EF4-FFF2-40B4-BE49-F238E27FC236}">
+                <a16:creationId xmlns:a16="http://schemas.microsoft.com/office/drawing/2014/main" id="{FC7D91EF-0396-41A0-8BB5-6ADB878EB767}"/>
+              </a:ext>
+            </a:extLst>
+          </p:cNvPr>
+          <p:cNvSpPr>
+            <a:spLocks noGrp="1"/>
+          </p:cNvSpPr>
+          <p:nvPr>
+            <p:ph type="body" idx="1"/>
+          </p:nvPr>
+        </p:nvSpPr>
+        <p:spPr/>
+        <p:txBody>
+          <a:bodyPr/>
+          <a:lstStyle/>
+          <a:p>
+            <a:r>
+              <a:rPr lang="es-CL" dirty="0"/>
+              <a:t>Clientes de alta frecuencia:</a:t>
+            </a:r>
+          </a:p>
+          <a:p>
+            <a:pPr lvl="1"/>
+            <a:r>
+              <a:rPr lang="es-CL" dirty="0"/>
+              <a:t>Corresponde a clientes que, además de tener una alta frecuencia de compra, poseen un alto gasto en compras; pero estos son un grupo bastante minoritario comparado al anterior. En cuanto al nivel de recencia, éste tiende a ser mayor al de los clientes de frecuencia promedio.</a:t>
+            </a:r>
+          </a:p>
+        </p:txBody>
+      </p:sp>
+    </p:spTree>
+    <p:extLst>
+      <p:ext uri="{BB962C8B-B14F-4D97-AF65-F5344CB8AC3E}">
+        <p14:creationId xmlns:p14="http://schemas.microsoft.com/office/powerpoint/2010/main" val="1562687978"/>
+      </p:ext>
+    </p:extLst>
+  </p:cSld>
+  <p:clrMapOvr>
+    <a:masterClrMapping/>
+  </p:clrMapOvr>
+</p:sld>
+</file>
+
+<file path=ppt/slides/slide18.xml><?xml version="1.0" encoding="utf-8"?>
+<p:sld xmlns:a="http://schemas.openxmlformats.org/drawingml/2006/main" xmlns:r="http://schemas.openxmlformats.org/officeDocument/2006/relationships" xmlns:p="http://schemas.openxmlformats.org/presentationml/2006/main">
+  <p:cSld>
+    <p:spTree>
+      <p:nvGrpSpPr>
+        <p:cNvPr id="1" name=""/>
+        <p:cNvGrpSpPr/>
+        <p:nvPr/>
+      </p:nvGrpSpPr>
+      <p:grpSpPr>
+        <a:xfrm>
+          <a:off x="0" y="0"/>
+          <a:ext cx="0" cy="0"/>
+          <a:chOff x="0" y="0"/>
+          <a:chExt cx="0" cy="0"/>
+        </a:xfrm>
+      </p:grpSpPr>
+      <p:sp>
+        <p:nvSpPr>
+          <p:cNvPr id="4" name="Título 3">
+            <a:extLst>
+              <a:ext uri="{FF2B5EF4-FFF2-40B4-BE49-F238E27FC236}">
+                <a16:creationId xmlns:a16="http://schemas.microsoft.com/office/drawing/2014/main" id="{F4AC31E8-7761-4B38-920A-C85DC9B035C0}"/>
+              </a:ext>
+            </a:extLst>
+          </p:cNvPr>
+          <p:cNvSpPr>
+            <a:spLocks noGrp="1"/>
+          </p:cNvSpPr>
+          <p:nvPr>
+            <p:ph type="title"/>
+          </p:nvPr>
+        </p:nvSpPr>
+        <p:spPr/>
+        <p:txBody>
+          <a:bodyPr/>
+          <a:lstStyle/>
+          <a:p>
+            <a:r>
+              <a:rPr lang="es-CL" dirty="0"/>
+              <a:t>Características de cada tipo de cliente</a:t>
+            </a:r>
+          </a:p>
+        </p:txBody>
+      </p:sp>
+      <p:sp>
+        <p:nvSpPr>
+          <p:cNvPr id="5" name="Marcador de texto 4">
+            <a:extLst>
+              <a:ext uri="{FF2B5EF4-FFF2-40B4-BE49-F238E27FC236}">
+                <a16:creationId xmlns:a16="http://schemas.microsoft.com/office/drawing/2014/main" id="{FC7D91EF-0396-41A0-8BB5-6ADB878EB767}"/>
+              </a:ext>
+            </a:extLst>
+          </p:cNvPr>
+          <p:cNvSpPr>
+            <a:spLocks noGrp="1"/>
+          </p:cNvSpPr>
+          <p:nvPr>
+            <p:ph type="body" idx="1"/>
+          </p:nvPr>
+        </p:nvSpPr>
+        <p:spPr/>
+        <p:txBody>
+          <a:bodyPr/>
+          <a:lstStyle/>
+          <a:p>
+            <a:r>
+              <a:rPr lang="es-CL" dirty="0"/>
               <a:t>Clientes de frecuencia baja:</a:t>
             </a:r>
           </a:p>
@@ -11661,7 +11950,7 @@
 </p:sld>
 </file>
 
-<file path=ppt/slides/slide17.xml><?xml version="1.0" encoding="utf-8"?>
+<file path=ppt/slides/slide19.xml><?xml version="1.0" encoding="utf-8"?>
 <p:sld xmlns:a="http://schemas.openxmlformats.org/drawingml/2006/main" xmlns:r="http://schemas.openxmlformats.org/officeDocument/2006/relationships" xmlns:p="http://schemas.openxmlformats.org/presentationml/2006/main">
   <p:cSld>
     <p:spTree>
@@ -11750,202 +12039,6 @@
     <p:extLst>
       <p:ext uri="{BB962C8B-B14F-4D97-AF65-F5344CB8AC3E}">
         <p14:creationId xmlns:p14="http://schemas.microsoft.com/office/powerpoint/2010/main" val="1746099302"/>
-      </p:ext>
-    </p:extLst>
-  </p:cSld>
-  <p:clrMapOvr>
-    <a:masterClrMapping/>
-  </p:clrMapOvr>
-</p:sld>
-</file>
-
-<file path=ppt/slides/slide18.xml><?xml version="1.0" encoding="utf-8"?>
-<p:sld xmlns:a="http://schemas.openxmlformats.org/drawingml/2006/main" xmlns:r="http://schemas.openxmlformats.org/officeDocument/2006/relationships" xmlns:p="http://schemas.openxmlformats.org/presentationml/2006/main">
-  <p:cSld>
-    <p:spTree>
-      <p:nvGrpSpPr>
-        <p:cNvPr id="1" name=""/>
-        <p:cNvGrpSpPr/>
-        <p:nvPr/>
-      </p:nvGrpSpPr>
-      <p:grpSpPr>
-        <a:xfrm>
-          <a:off x="0" y="0"/>
-          <a:ext cx="0" cy="0"/>
-          <a:chOff x="0" y="0"/>
-          <a:chExt cx="0" cy="0"/>
-        </a:xfrm>
-      </p:grpSpPr>
-      <p:sp>
-        <p:nvSpPr>
-          <p:cNvPr id="2" name="Título 1">
-            <a:extLst>
-              <a:ext uri="{FF2B5EF4-FFF2-40B4-BE49-F238E27FC236}">
-                <a16:creationId xmlns:a16="http://schemas.microsoft.com/office/drawing/2014/main" id="{E7CE5FA8-50F9-440F-8787-F71689B4DECC}"/>
-              </a:ext>
-            </a:extLst>
-          </p:cNvPr>
-          <p:cNvSpPr>
-            <a:spLocks noGrp="1"/>
-          </p:cNvSpPr>
-          <p:nvPr>
-            <p:ph type="title"/>
-          </p:nvPr>
-        </p:nvSpPr>
-        <p:spPr>
-          <a:xfrm>
-            <a:off x="71270" y="121640"/>
-            <a:ext cx="8143600" cy="528400"/>
-          </a:xfrm>
-        </p:spPr>
-        <p:txBody>
-          <a:bodyPr/>
-          <a:lstStyle/>
-          <a:p>
-            <a:r>
-              <a:rPr lang="es-CL" dirty="0"/>
-              <a:t>Volumen de compras por mes - año</a:t>
-            </a:r>
-          </a:p>
-        </p:txBody>
-      </p:sp>
-      <p:pic>
-        <p:nvPicPr>
-          <p:cNvPr id="5" name="Imagen 4" descr="Gráfico, Histograma&#10;&#10;Descripción generada automáticamente">
-            <a:extLst>
-              <a:ext uri="{FF2B5EF4-FFF2-40B4-BE49-F238E27FC236}">
-                <a16:creationId xmlns:a16="http://schemas.microsoft.com/office/drawing/2014/main" id="{FFD03852-D004-418B-894E-9BA544EB6624}"/>
-              </a:ext>
-            </a:extLst>
-          </p:cNvPr>
-          <p:cNvPicPr>
-            <a:picLocks noChangeAspect="1"/>
-          </p:cNvPicPr>
-          <p:nvPr/>
-        </p:nvPicPr>
-        <p:blipFill rotWithShape="1">
-          <a:blip r:embed="rId2">
-            <a:extLst>
-              <a:ext uri="{28A0092B-C50C-407E-A947-70E740481C1C}">
-                <a14:useLocalDpi xmlns:a14="http://schemas.microsoft.com/office/drawing/2010/main" val="0"/>
-              </a:ext>
-            </a:extLst>
-          </a:blip>
-          <a:srcRect l="6969" t="11622" r="9606" b="1773"/>
-          <a:stretch/>
-        </p:blipFill>
-        <p:spPr>
-          <a:xfrm>
-            <a:off x="234892" y="796954"/>
-            <a:ext cx="8581938" cy="5939406"/>
-          </a:xfrm>
-          <a:prstGeom prst="rect">
-            <a:avLst/>
-          </a:prstGeom>
-        </p:spPr>
-      </p:pic>
-    </p:spTree>
-    <p:extLst>
-      <p:ext uri="{BB962C8B-B14F-4D97-AF65-F5344CB8AC3E}">
-        <p14:creationId xmlns:p14="http://schemas.microsoft.com/office/powerpoint/2010/main" val="2288486436"/>
-      </p:ext>
-    </p:extLst>
-  </p:cSld>
-  <p:clrMapOvr>
-    <a:masterClrMapping/>
-  </p:clrMapOvr>
-</p:sld>
-</file>
-
-<file path=ppt/slides/slide19.xml><?xml version="1.0" encoding="utf-8"?>
-<p:sld xmlns:a="http://schemas.openxmlformats.org/drawingml/2006/main" xmlns:r="http://schemas.openxmlformats.org/officeDocument/2006/relationships" xmlns:p="http://schemas.openxmlformats.org/presentationml/2006/main">
-  <p:cSld>
-    <p:spTree>
-      <p:nvGrpSpPr>
-        <p:cNvPr id="1" name=""/>
-        <p:cNvGrpSpPr/>
-        <p:nvPr/>
-      </p:nvGrpSpPr>
-      <p:grpSpPr>
-        <a:xfrm>
-          <a:off x="0" y="0"/>
-          <a:ext cx="0" cy="0"/>
-          <a:chOff x="0" y="0"/>
-          <a:chExt cx="0" cy="0"/>
-        </a:xfrm>
-      </p:grpSpPr>
-      <p:sp>
-        <p:nvSpPr>
-          <p:cNvPr id="2" name="Título 1">
-            <a:extLst>
-              <a:ext uri="{FF2B5EF4-FFF2-40B4-BE49-F238E27FC236}">
-                <a16:creationId xmlns:a16="http://schemas.microsoft.com/office/drawing/2014/main" id="{32FF52B5-38BA-4F8A-9FE9-34F3A822CFD3}"/>
-              </a:ext>
-            </a:extLst>
-          </p:cNvPr>
-          <p:cNvSpPr>
-            <a:spLocks noGrp="1"/>
-          </p:cNvSpPr>
-          <p:nvPr>
-            <p:ph type="title"/>
-          </p:nvPr>
-        </p:nvSpPr>
-        <p:spPr>
-          <a:xfrm>
-            <a:off x="96437" y="140612"/>
-            <a:ext cx="8143600" cy="528400"/>
-          </a:xfrm>
-        </p:spPr>
-        <p:txBody>
-          <a:bodyPr/>
-          <a:lstStyle/>
-          <a:p>
-            <a:r>
-              <a:rPr lang="es-CL" dirty="0"/>
-              <a:t>Volumen de compras por semanas</a:t>
-            </a:r>
-          </a:p>
-        </p:txBody>
-      </p:sp>
-      <p:pic>
-        <p:nvPicPr>
-          <p:cNvPr id="5" name="Imagen 4" descr="Gráfico, Histograma&#10;&#10;Descripción generada automáticamente">
-            <a:extLst>
-              <a:ext uri="{FF2B5EF4-FFF2-40B4-BE49-F238E27FC236}">
-                <a16:creationId xmlns:a16="http://schemas.microsoft.com/office/drawing/2014/main" id="{16C4CB79-0446-44BA-84A5-3BE58B6A1B71}"/>
-              </a:ext>
-            </a:extLst>
-          </p:cNvPr>
-          <p:cNvPicPr>
-            <a:picLocks noChangeAspect="1"/>
-          </p:cNvPicPr>
-          <p:nvPr/>
-        </p:nvPicPr>
-        <p:blipFill rotWithShape="1">
-          <a:blip r:embed="rId2">
-            <a:extLst>
-              <a:ext uri="{28A0092B-C50C-407E-A947-70E740481C1C}">
-                <a14:useLocalDpi xmlns:a14="http://schemas.microsoft.com/office/drawing/2010/main" val="0"/>
-              </a:ext>
-            </a:extLst>
-          </a:blip>
-          <a:srcRect l="7295" t="11376" r="9443" b="6055"/>
-          <a:stretch/>
-        </p:blipFill>
-        <p:spPr>
-          <a:xfrm>
-            <a:off x="96437" y="809624"/>
-            <a:ext cx="9148729" cy="6048376"/>
-          </a:xfrm>
-          <a:prstGeom prst="rect">
-            <a:avLst/>
-          </a:prstGeom>
-        </p:spPr>
-      </p:pic>
-    </p:spTree>
-    <p:extLst>
-      <p:ext uri="{BB962C8B-B14F-4D97-AF65-F5344CB8AC3E}">
-        <p14:creationId xmlns:p14="http://schemas.microsoft.com/office/powerpoint/2010/main" val="2924971736"/>
       </p:ext>
     </p:extLst>
   </p:cSld>
@@ -12143,6 +12236,434 @@
       </p:grpSpPr>
       <p:sp>
         <p:nvSpPr>
+          <p:cNvPr id="2" name="Título 1">
+            <a:extLst>
+              <a:ext uri="{FF2B5EF4-FFF2-40B4-BE49-F238E27FC236}">
+                <a16:creationId xmlns:a16="http://schemas.microsoft.com/office/drawing/2014/main" id="{559BEABB-3677-4BD9-A21B-A2D66A2410B0}"/>
+              </a:ext>
+            </a:extLst>
+          </p:cNvPr>
+          <p:cNvSpPr>
+            <a:spLocks noGrp="1"/>
+          </p:cNvSpPr>
+          <p:nvPr>
+            <p:ph type="title"/>
+          </p:nvPr>
+        </p:nvSpPr>
+        <p:spPr/>
+        <p:txBody>
+          <a:bodyPr/>
+          <a:lstStyle/>
+          <a:p>
+            <a:r>
+              <a:rPr lang="es-CL" dirty="0"/>
+              <a:t>Ventas por día</a:t>
+            </a:r>
+          </a:p>
+        </p:txBody>
+      </p:sp>
+      <p:sp>
+        <p:nvSpPr>
+          <p:cNvPr id="3" name="Marcador de texto 2">
+            <a:extLst>
+              <a:ext uri="{FF2B5EF4-FFF2-40B4-BE49-F238E27FC236}">
+                <a16:creationId xmlns:a16="http://schemas.microsoft.com/office/drawing/2014/main" id="{94640230-8CA7-4531-8B7E-C93EC65C40FB}"/>
+              </a:ext>
+            </a:extLst>
+          </p:cNvPr>
+          <p:cNvSpPr>
+            <a:spLocks noGrp="1"/>
+          </p:cNvSpPr>
+          <p:nvPr>
+            <p:ph type="body" idx="1"/>
+          </p:nvPr>
+        </p:nvSpPr>
+        <p:spPr>
+          <a:xfrm>
+            <a:off x="734000" y="1805264"/>
+            <a:ext cx="8143600" cy="4461312"/>
+          </a:xfrm>
+        </p:spPr>
+        <p:txBody>
+          <a:bodyPr/>
+          <a:lstStyle/>
+          <a:p>
+            <a:r>
+              <a:rPr lang="es-CL" b="0" dirty="0">
+                <a:solidFill>
+                  <a:srgbClr val="000000"/>
+                </a:solidFill>
+                <a:effectLst/>
+                <a:latin typeface="Helvetica Neue"/>
+              </a:rPr>
+              <a:t>El día que se realiza mayor número de ventas es el jueves y el día que tiene menor número de ventas es el domingo. </a:t>
+            </a:r>
+          </a:p>
+          <a:p>
+            <a:r>
+              <a:rPr lang="es-CL" b="0" dirty="0">
+                <a:solidFill>
+                  <a:srgbClr val="000000"/>
+                </a:solidFill>
+                <a:effectLst/>
+                <a:latin typeface="Helvetica Neue"/>
+              </a:rPr>
+              <a:t>Esta información puede ser de utilidad al mezclara con: el tramo horario y rango de días de mayor venta, si además se mezcla con los productos más comprados por cada segmento de cliente, se puede elaborar una buena estrategia de marketing.</a:t>
+            </a:r>
+            <a:endParaRPr lang="es-CL" dirty="0"/>
+          </a:p>
+        </p:txBody>
+      </p:sp>
+    </p:spTree>
+    <p:extLst>
+      <p:ext uri="{BB962C8B-B14F-4D97-AF65-F5344CB8AC3E}">
+        <p14:creationId xmlns:p14="http://schemas.microsoft.com/office/powerpoint/2010/main" val="1512786013"/>
+      </p:ext>
+    </p:extLst>
+  </p:cSld>
+  <p:clrMapOvr>
+    <a:masterClrMapping/>
+  </p:clrMapOvr>
+</p:sld>
+</file>
+
+<file path=ppt/slides/slide21.xml><?xml version="1.0" encoding="utf-8"?>
+<p:sld xmlns:a="http://schemas.openxmlformats.org/drawingml/2006/main" xmlns:r="http://schemas.openxmlformats.org/officeDocument/2006/relationships" xmlns:p="http://schemas.openxmlformats.org/presentationml/2006/main">
+  <p:cSld>
+    <p:spTree>
+      <p:nvGrpSpPr>
+        <p:cNvPr id="1" name=""/>
+        <p:cNvGrpSpPr/>
+        <p:nvPr/>
+      </p:nvGrpSpPr>
+      <p:grpSpPr>
+        <a:xfrm>
+          <a:off x="0" y="0"/>
+          <a:ext cx="0" cy="0"/>
+          <a:chOff x="0" y="0"/>
+          <a:chExt cx="0" cy="0"/>
+        </a:xfrm>
+      </p:grpSpPr>
+      <p:sp>
+        <p:nvSpPr>
+          <p:cNvPr id="2" name="Título 1">
+            <a:extLst>
+              <a:ext uri="{FF2B5EF4-FFF2-40B4-BE49-F238E27FC236}">
+                <a16:creationId xmlns:a16="http://schemas.microsoft.com/office/drawing/2014/main" id="{E7CE5FA8-50F9-440F-8787-F71689B4DECC}"/>
+              </a:ext>
+            </a:extLst>
+          </p:cNvPr>
+          <p:cNvSpPr>
+            <a:spLocks noGrp="1"/>
+          </p:cNvSpPr>
+          <p:nvPr>
+            <p:ph type="title"/>
+          </p:nvPr>
+        </p:nvSpPr>
+        <p:spPr>
+          <a:xfrm>
+            <a:off x="71270" y="121640"/>
+            <a:ext cx="8143600" cy="528400"/>
+          </a:xfrm>
+        </p:spPr>
+        <p:txBody>
+          <a:bodyPr/>
+          <a:lstStyle/>
+          <a:p>
+            <a:r>
+              <a:rPr lang="es-CL" dirty="0"/>
+              <a:t>Volumen de compras por mes - año</a:t>
+            </a:r>
+          </a:p>
+        </p:txBody>
+      </p:sp>
+      <p:pic>
+        <p:nvPicPr>
+          <p:cNvPr id="5" name="Imagen 4" descr="Gráfico, Histograma&#10;&#10;Descripción generada automáticamente">
+            <a:extLst>
+              <a:ext uri="{FF2B5EF4-FFF2-40B4-BE49-F238E27FC236}">
+                <a16:creationId xmlns:a16="http://schemas.microsoft.com/office/drawing/2014/main" id="{FFD03852-D004-418B-894E-9BA544EB6624}"/>
+              </a:ext>
+            </a:extLst>
+          </p:cNvPr>
+          <p:cNvPicPr>
+            <a:picLocks noChangeAspect="1"/>
+          </p:cNvPicPr>
+          <p:nvPr/>
+        </p:nvPicPr>
+        <p:blipFill rotWithShape="1">
+          <a:blip r:embed="rId2">
+            <a:extLst>
+              <a:ext uri="{28A0092B-C50C-407E-A947-70E740481C1C}">
+                <a14:useLocalDpi xmlns:a14="http://schemas.microsoft.com/office/drawing/2010/main" val="0"/>
+              </a:ext>
+            </a:extLst>
+          </a:blip>
+          <a:srcRect l="6969" t="11622" r="9606" b="1773"/>
+          <a:stretch/>
+        </p:blipFill>
+        <p:spPr>
+          <a:xfrm>
+            <a:off x="234892" y="796954"/>
+            <a:ext cx="8581938" cy="5939406"/>
+          </a:xfrm>
+          <a:prstGeom prst="rect">
+            <a:avLst/>
+          </a:prstGeom>
+        </p:spPr>
+      </p:pic>
+    </p:spTree>
+    <p:extLst>
+      <p:ext uri="{BB962C8B-B14F-4D97-AF65-F5344CB8AC3E}">
+        <p14:creationId xmlns:p14="http://schemas.microsoft.com/office/powerpoint/2010/main" val="2288486436"/>
+      </p:ext>
+    </p:extLst>
+  </p:cSld>
+  <p:clrMapOvr>
+    <a:masterClrMapping/>
+  </p:clrMapOvr>
+</p:sld>
+</file>
+
+<file path=ppt/slides/slide22.xml><?xml version="1.0" encoding="utf-8"?>
+<p:sld xmlns:a="http://schemas.openxmlformats.org/drawingml/2006/main" xmlns:r="http://schemas.openxmlformats.org/officeDocument/2006/relationships" xmlns:p="http://schemas.openxmlformats.org/presentationml/2006/main">
+  <p:cSld>
+    <p:spTree>
+      <p:nvGrpSpPr>
+        <p:cNvPr id="1" name=""/>
+        <p:cNvGrpSpPr/>
+        <p:nvPr/>
+      </p:nvGrpSpPr>
+      <p:grpSpPr>
+        <a:xfrm>
+          <a:off x="0" y="0"/>
+          <a:ext cx="0" cy="0"/>
+          <a:chOff x="0" y="0"/>
+          <a:chExt cx="0" cy="0"/>
+        </a:xfrm>
+      </p:grpSpPr>
+      <p:sp>
+        <p:nvSpPr>
+          <p:cNvPr id="2" name="Título 1">
+            <a:extLst>
+              <a:ext uri="{FF2B5EF4-FFF2-40B4-BE49-F238E27FC236}">
+                <a16:creationId xmlns:a16="http://schemas.microsoft.com/office/drawing/2014/main" id="{3000BDC9-68C6-4318-8F1D-DF7235CACFB3}"/>
+              </a:ext>
+            </a:extLst>
+          </p:cNvPr>
+          <p:cNvSpPr>
+            <a:spLocks noGrp="1"/>
+          </p:cNvSpPr>
+          <p:nvPr>
+            <p:ph type="title"/>
+          </p:nvPr>
+        </p:nvSpPr>
+        <p:spPr/>
+        <p:txBody>
+          <a:bodyPr/>
+          <a:lstStyle/>
+          <a:p>
+            <a:r>
+              <a:rPr lang="es-CL" dirty="0"/>
+              <a:t>Ventas por meses</a:t>
+            </a:r>
+          </a:p>
+        </p:txBody>
+      </p:sp>
+      <p:sp>
+        <p:nvSpPr>
+          <p:cNvPr id="3" name="Marcador de texto 2">
+            <a:extLst>
+              <a:ext uri="{FF2B5EF4-FFF2-40B4-BE49-F238E27FC236}">
+                <a16:creationId xmlns:a16="http://schemas.microsoft.com/office/drawing/2014/main" id="{FD3B3A51-F3CD-4D50-853F-8460B43B445C}"/>
+              </a:ext>
+            </a:extLst>
+          </p:cNvPr>
+          <p:cNvSpPr>
+            <a:spLocks noGrp="1"/>
+          </p:cNvSpPr>
+          <p:nvPr>
+            <p:ph type="body" idx="1"/>
+          </p:nvPr>
+        </p:nvSpPr>
+        <p:spPr/>
+        <p:txBody>
+          <a:bodyPr/>
+          <a:lstStyle/>
+          <a:p>
+            <a:r>
+              <a:rPr lang="es-CL" b="0" dirty="0">
+                <a:solidFill>
+                  <a:srgbClr val="000000"/>
+                </a:solidFill>
+                <a:effectLst/>
+              </a:rPr>
+              <a:t>Se puede apreciar un claro ascenso de ventas a partir del mes de septiembre del año 2011 y que baja abruptamente en diciembre del mismo año. </a:t>
+            </a:r>
+          </a:p>
+          <a:p>
+            <a:r>
+              <a:rPr lang="es-CL" b="0" dirty="0">
+                <a:solidFill>
+                  <a:srgbClr val="000000"/>
+                </a:solidFill>
+                <a:effectLst/>
+              </a:rPr>
+              <a:t>Esto se debe a que lamentablemente, el set de datos no abarcó todo el mes de diciembre (llegó hasta el 9 de diciembre). </a:t>
+            </a:r>
+          </a:p>
+          <a:p>
+            <a:r>
+              <a:rPr lang="es-CL" dirty="0">
+                <a:solidFill>
+                  <a:srgbClr val="000000"/>
+                </a:solidFill>
+              </a:rPr>
+              <a:t>E</a:t>
+            </a:r>
+            <a:r>
+              <a:rPr lang="es-CL" b="0" dirty="0">
+                <a:solidFill>
+                  <a:srgbClr val="000000"/>
+                </a:solidFill>
+                <a:effectLst/>
+              </a:rPr>
+              <a:t>sa temporada corresponde a la víspera de navidad, temporada que se realiza mayor número de ventas. </a:t>
+            </a:r>
+            <a:endParaRPr lang="es-CL" dirty="0"/>
+          </a:p>
+        </p:txBody>
+      </p:sp>
+    </p:spTree>
+    <p:extLst>
+      <p:ext uri="{BB962C8B-B14F-4D97-AF65-F5344CB8AC3E}">
+        <p14:creationId xmlns:p14="http://schemas.microsoft.com/office/powerpoint/2010/main" val="3819617231"/>
+      </p:ext>
+    </p:extLst>
+  </p:cSld>
+  <p:clrMapOvr>
+    <a:masterClrMapping/>
+  </p:clrMapOvr>
+</p:sld>
+</file>
+
+<file path=ppt/slides/slide23.xml><?xml version="1.0" encoding="utf-8"?>
+<p:sld xmlns:a="http://schemas.openxmlformats.org/drawingml/2006/main" xmlns:r="http://schemas.openxmlformats.org/officeDocument/2006/relationships" xmlns:p="http://schemas.openxmlformats.org/presentationml/2006/main">
+  <p:cSld>
+    <p:spTree>
+      <p:nvGrpSpPr>
+        <p:cNvPr id="1" name=""/>
+        <p:cNvGrpSpPr/>
+        <p:nvPr/>
+      </p:nvGrpSpPr>
+      <p:grpSpPr>
+        <a:xfrm>
+          <a:off x="0" y="0"/>
+          <a:ext cx="0" cy="0"/>
+          <a:chOff x="0" y="0"/>
+          <a:chExt cx="0" cy="0"/>
+        </a:xfrm>
+      </p:grpSpPr>
+      <p:sp>
+        <p:nvSpPr>
+          <p:cNvPr id="2" name="Título 1">
+            <a:extLst>
+              <a:ext uri="{FF2B5EF4-FFF2-40B4-BE49-F238E27FC236}">
+                <a16:creationId xmlns:a16="http://schemas.microsoft.com/office/drawing/2014/main" id="{32FF52B5-38BA-4F8A-9FE9-34F3A822CFD3}"/>
+              </a:ext>
+            </a:extLst>
+          </p:cNvPr>
+          <p:cNvSpPr>
+            <a:spLocks noGrp="1"/>
+          </p:cNvSpPr>
+          <p:nvPr>
+            <p:ph type="title"/>
+          </p:nvPr>
+        </p:nvSpPr>
+        <p:spPr>
+          <a:xfrm>
+            <a:off x="96437" y="140612"/>
+            <a:ext cx="8143600" cy="528400"/>
+          </a:xfrm>
+        </p:spPr>
+        <p:txBody>
+          <a:bodyPr/>
+          <a:lstStyle/>
+          <a:p>
+            <a:r>
+              <a:rPr lang="es-CL" dirty="0"/>
+              <a:t>Volumen de compras por semanas</a:t>
+            </a:r>
+          </a:p>
+        </p:txBody>
+      </p:sp>
+      <p:pic>
+        <p:nvPicPr>
+          <p:cNvPr id="5" name="Imagen 4" descr="Gráfico, Histograma&#10;&#10;Descripción generada automáticamente">
+            <a:extLst>
+              <a:ext uri="{FF2B5EF4-FFF2-40B4-BE49-F238E27FC236}">
+                <a16:creationId xmlns:a16="http://schemas.microsoft.com/office/drawing/2014/main" id="{16C4CB79-0446-44BA-84A5-3BE58B6A1B71}"/>
+              </a:ext>
+            </a:extLst>
+          </p:cNvPr>
+          <p:cNvPicPr>
+            <a:picLocks noChangeAspect="1"/>
+          </p:cNvPicPr>
+          <p:nvPr/>
+        </p:nvPicPr>
+        <p:blipFill rotWithShape="1">
+          <a:blip r:embed="rId2">
+            <a:extLst>
+              <a:ext uri="{28A0092B-C50C-407E-A947-70E740481C1C}">
+                <a14:useLocalDpi xmlns:a14="http://schemas.microsoft.com/office/drawing/2010/main" val="0"/>
+              </a:ext>
+            </a:extLst>
+          </a:blip>
+          <a:srcRect l="7295" t="11376" r="9443" b="6055"/>
+          <a:stretch/>
+        </p:blipFill>
+        <p:spPr>
+          <a:xfrm>
+            <a:off x="96437" y="809624"/>
+            <a:ext cx="9148729" cy="6048376"/>
+          </a:xfrm>
+          <a:prstGeom prst="rect">
+            <a:avLst/>
+          </a:prstGeom>
+        </p:spPr>
+      </p:pic>
+    </p:spTree>
+    <p:extLst>
+      <p:ext uri="{BB962C8B-B14F-4D97-AF65-F5344CB8AC3E}">
+        <p14:creationId xmlns:p14="http://schemas.microsoft.com/office/powerpoint/2010/main" val="2924971736"/>
+      </p:ext>
+    </p:extLst>
+  </p:cSld>
+  <p:clrMapOvr>
+    <a:masterClrMapping/>
+  </p:clrMapOvr>
+</p:sld>
+</file>
+
+<file path=ppt/slides/slide24.xml><?xml version="1.0" encoding="utf-8"?>
+<p:sld xmlns:a="http://schemas.openxmlformats.org/drawingml/2006/main" xmlns:r="http://schemas.openxmlformats.org/officeDocument/2006/relationships" xmlns:p="http://schemas.openxmlformats.org/presentationml/2006/main">
+  <p:cSld>
+    <p:spTree>
+      <p:nvGrpSpPr>
+        <p:cNvPr id="1" name=""/>
+        <p:cNvGrpSpPr/>
+        <p:nvPr/>
+      </p:nvGrpSpPr>
+      <p:grpSpPr>
+        <a:xfrm>
+          <a:off x="0" y="0"/>
+          <a:ext cx="0" cy="0"/>
+          <a:chOff x="0" y="0"/>
+          <a:chExt cx="0" cy="0"/>
+        </a:xfrm>
+      </p:grpSpPr>
+      <p:sp>
+        <p:nvSpPr>
           <p:cNvPr id="4" name="Marcador de texto 3">
             <a:extLst>
               <a:ext uri="{FF2B5EF4-FFF2-40B4-BE49-F238E27FC236}">
@@ -12157,14 +12678,19 @@
             <p:ph type="body" idx="1"/>
           </p:nvPr>
         </p:nvSpPr>
-        <p:spPr/>
+        <p:spPr>
+          <a:xfrm>
+            <a:off x="1374216" y="2038833"/>
+            <a:ext cx="6620491" cy="4504580"/>
+          </a:xfrm>
+        </p:spPr>
         <p:txBody>
           <a:bodyPr/>
           <a:lstStyle/>
           <a:p>
             <a:r>
-              <a:rPr lang="es-CL" dirty="0"/>
-              <a:t>Se puede apreciar un claro ascenso de compras previo a la temporada de navidad.</a:t>
+              <a:rPr lang="es-CL" sz="3600" dirty="0"/>
+              <a:t>Se puede apreciar un claro ascenso de compras previo a la temporada de navidad, debido a que los datos no abarcan dicha fecha, que es probablemente de muy alta venta</a:t>
             </a:r>
           </a:p>
         </p:txBody>
@@ -12182,7 +12708,7 @@
 </p:sld>
 </file>
 
-<file path=ppt/slides/slide21.xml><?xml version="1.0" encoding="utf-8"?>
+<file path=ppt/slides/slide25.xml><?xml version="1.0" encoding="utf-8"?>
 <p:sld xmlns:a="http://schemas.openxmlformats.org/drawingml/2006/main" xmlns:r="http://schemas.openxmlformats.org/officeDocument/2006/relationships" xmlns:p="http://schemas.openxmlformats.org/presentationml/2006/main">
   <p:cSld>
     <p:spTree>
@@ -12280,7 +12806,99 @@
 </p:sld>
 </file>
 
-<file path=ppt/slides/slide22.xml><?xml version="1.0" encoding="utf-8"?>
+<file path=ppt/slides/slide26.xml><?xml version="1.0" encoding="utf-8"?>
+<p:sld xmlns:a="http://schemas.openxmlformats.org/drawingml/2006/main" xmlns:r="http://schemas.openxmlformats.org/officeDocument/2006/relationships" xmlns:p="http://schemas.openxmlformats.org/presentationml/2006/main">
+  <p:cSld>
+    <p:spTree>
+      <p:nvGrpSpPr>
+        <p:cNvPr id="1" name=""/>
+        <p:cNvGrpSpPr/>
+        <p:nvPr/>
+      </p:nvGrpSpPr>
+      <p:grpSpPr>
+        <a:xfrm>
+          <a:off x="0" y="0"/>
+          <a:ext cx="0" cy="0"/>
+          <a:chOff x="0" y="0"/>
+          <a:chExt cx="0" cy="0"/>
+        </a:xfrm>
+      </p:grpSpPr>
+      <p:sp>
+        <p:nvSpPr>
+          <p:cNvPr id="2" name="Título 1">
+            <a:extLst>
+              <a:ext uri="{FF2B5EF4-FFF2-40B4-BE49-F238E27FC236}">
+                <a16:creationId xmlns:a16="http://schemas.microsoft.com/office/drawing/2014/main" id="{C1354E45-0A81-4EF5-9402-D51320F0797C}"/>
+              </a:ext>
+            </a:extLst>
+          </p:cNvPr>
+          <p:cNvSpPr>
+            <a:spLocks noGrp="1"/>
+          </p:cNvSpPr>
+          <p:nvPr>
+            <p:ph type="title"/>
+          </p:nvPr>
+        </p:nvSpPr>
+        <p:spPr/>
+        <p:txBody>
+          <a:bodyPr/>
+          <a:lstStyle/>
+          <a:p>
+            <a:r>
+              <a:rPr lang="es-CL" dirty="0"/>
+              <a:t>Ventas respecto a devoluciones</a:t>
+            </a:r>
+          </a:p>
+        </p:txBody>
+      </p:sp>
+      <p:sp>
+        <p:nvSpPr>
+          <p:cNvPr id="3" name="Marcador de texto 2">
+            <a:extLst>
+              <a:ext uri="{FF2B5EF4-FFF2-40B4-BE49-F238E27FC236}">
+                <a16:creationId xmlns:a16="http://schemas.microsoft.com/office/drawing/2014/main" id="{A9251FA7-CB2A-4766-882B-8D39E7550E2C}"/>
+              </a:ext>
+            </a:extLst>
+          </p:cNvPr>
+          <p:cNvSpPr>
+            <a:spLocks noGrp="1"/>
+          </p:cNvSpPr>
+          <p:nvPr>
+            <p:ph type="body" idx="1"/>
+          </p:nvPr>
+        </p:nvSpPr>
+        <p:spPr/>
+        <p:txBody>
+          <a:bodyPr/>
+          <a:lstStyle/>
+          <a:p>
+            <a:r>
+              <a:rPr lang="es-CL" b="0" dirty="0">
+                <a:solidFill>
+                  <a:srgbClr val="000000"/>
+                </a:solidFill>
+                <a:effectLst/>
+              </a:rPr>
+              <a:t>Se puede apreciar que la comercializadora tiene un alto grado de eficacia respecto a las ventas, ya que éstas representan casi la totalidad de los registros correspondientes a toda la base de datos.</a:t>
+            </a:r>
+            <a:endParaRPr lang="es-CL" dirty="0"/>
+          </a:p>
+        </p:txBody>
+      </p:sp>
+    </p:spTree>
+    <p:extLst>
+      <p:ext uri="{BB962C8B-B14F-4D97-AF65-F5344CB8AC3E}">
+        <p14:creationId xmlns:p14="http://schemas.microsoft.com/office/powerpoint/2010/main" val="2361220420"/>
+      </p:ext>
+    </p:extLst>
+  </p:cSld>
+  <p:clrMapOvr>
+    <a:masterClrMapping/>
+  </p:clrMapOvr>
+</p:sld>
+</file>
+
+<file path=ppt/slides/slide27.xml><?xml version="1.0" encoding="utf-8"?>
 <p:sld xmlns:a="http://schemas.openxmlformats.org/drawingml/2006/main" xmlns:r="http://schemas.openxmlformats.org/officeDocument/2006/relationships" xmlns:p="http://schemas.openxmlformats.org/presentationml/2006/main">
   <p:cSld>
     <p:spTree>
@@ -12378,7 +12996,110 @@
 </p:sld>
 </file>
 
-<file path=ppt/slides/slide23.xml><?xml version="1.0" encoding="utf-8"?>
+<file path=ppt/slides/slide28.xml><?xml version="1.0" encoding="utf-8"?>
+<p:sld xmlns:a="http://schemas.openxmlformats.org/drawingml/2006/main" xmlns:r="http://schemas.openxmlformats.org/officeDocument/2006/relationships" xmlns:p="http://schemas.openxmlformats.org/presentationml/2006/main">
+  <p:cSld>
+    <p:spTree>
+      <p:nvGrpSpPr>
+        <p:cNvPr id="1" name=""/>
+        <p:cNvGrpSpPr/>
+        <p:nvPr/>
+      </p:nvGrpSpPr>
+      <p:grpSpPr>
+        <a:xfrm>
+          <a:off x="0" y="0"/>
+          <a:ext cx="0" cy="0"/>
+          <a:chOff x="0" y="0"/>
+          <a:chExt cx="0" cy="0"/>
+        </a:xfrm>
+      </p:grpSpPr>
+      <p:sp>
+        <p:nvSpPr>
+          <p:cNvPr id="2" name="Título 1">
+            <a:extLst>
+              <a:ext uri="{FF2B5EF4-FFF2-40B4-BE49-F238E27FC236}">
+                <a16:creationId xmlns:a16="http://schemas.microsoft.com/office/drawing/2014/main" id="{677C4564-DBA1-4BE4-AEC1-0069E83EA3B1}"/>
+              </a:ext>
+            </a:extLst>
+          </p:cNvPr>
+          <p:cNvSpPr>
+            <a:spLocks noGrp="1"/>
+          </p:cNvSpPr>
+          <p:nvPr>
+            <p:ph type="title"/>
+          </p:nvPr>
+        </p:nvSpPr>
+        <p:spPr/>
+        <p:txBody>
+          <a:bodyPr/>
+          <a:lstStyle/>
+          <a:p>
+            <a:r>
+              <a:rPr lang="es-CL" dirty="0"/>
+              <a:t>Productos más devueltos</a:t>
+            </a:r>
+          </a:p>
+        </p:txBody>
+      </p:sp>
+      <p:sp>
+        <p:nvSpPr>
+          <p:cNvPr id="3" name="Marcador de texto 2">
+            <a:extLst>
+              <a:ext uri="{FF2B5EF4-FFF2-40B4-BE49-F238E27FC236}">
+                <a16:creationId xmlns:a16="http://schemas.microsoft.com/office/drawing/2014/main" id="{6A978329-3D77-48AD-AC1C-61F5FD9E1FBB}"/>
+              </a:ext>
+            </a:extLst>
+          </p:cNvPr>
+          <p:cNvSpPr>
+            <a:spLocks noGrp="1"/>
+          </p:cNvSpPr>
+          <p:nvPr>
+            <p:ph type="body" idx="1"/>
+          </p:nvPr>
+        </p:nvSpPr>
+        <p:spPr/>
+        <p:txBody>
+          <a:bodyPr/>
+          <a:lstStyle/>
+          <a:p>
+            <a:r>
+              <a:rPr lang="es-CL" b="0" dirty="0">
+                <a:solidFill>
+                  <a:srgbClr val="000000"/>
+                </a:solidFill>
+                <a:effectLst/>
+              </a:rPr>
+              <a:t>En base al listado, se puede realizar una observación relacionada al motivo de la devolución. </a:t>
+            </a:r>
+          </a:p>
+          <a:p>
+            <a:r>
+              <a:rPr lang="es-CL" b="0" dirty="0">
+                <a:solidFill>
+                  <a:srgbClr val="000000"/>
+                </a:solidFill>
+                <a:effectLst/>
+              </a:rPr>
+              <a:t>Esto permite discriminar si el producto es devuelto por fallos (para así hablar con el fabricante) o si es devuelto por algún otro motivo.</a:t>
+            </a:r>
+            <a:endParaRPr lang="es-CL" dirty="0"/>
+          </a:p>
+        </p:txBody>
+      </p:sp>
+    </p:spTree>
+    <p:extLst>
+      <p:ext uri="{BB962C8B-B14F-4D97-AF65-F5344CB8AC3E}">
+        <p14:creationId xmlns:p14="http://schemas.microsoft.com/office/powerpoint/2010/main" val="994356631"/>
+      </p:ext>
+    </p:extLst>
+  </p:cSld>
+  <p:clrMapOvr>
+    <a:masterClrMapping/>
+  </p:clrMapOvr>
+</p:sld>
+</file>
+
+<file path=ppt/slides/slide29.xml><?xml version="1.0" encoding="utf-8"?>
 <p:sld xmlns:a="http://schemas.openxmlformats.org/drawingml/2006/main" xmlns:r="http://schemas.openxmlformats.org/officeDocument/2006/relationships" xmlns:p="http://schemas.openxmlformats.org/presentationml/2006/main">
   <p:cSld>
     <p:spTree>
@@ -12476,7 +13197,238 @@
 </p:sld>
 </file>
 
-<file path=ppt/slides/slide24.xml><?xml version="1.0" encoding="utf-8"?>
+<file path=ppt/slides/slide3.xml><?xml version="1.0" encoding="utf-8"?>
+<p:sld xmlns:a="http://schemas.openxmlformats.org/drawingml/2006/main" xmlns:r="http://schemas.openxmlformats.org/officeDocument/2006/relationships" xmlns:p="http://schemas.openxmlformats.org/presentationml/2006/main">
+  <p:cSld>
+    <p:spTree>
+      <p:nvGrpSpPr>
+        <p:cNvPr id="1" name=""/>
+        <p:cNvGrpSpPr/>
+        <p:nvPr/>
+      </p:nvGrpSpPr>
+      <p:grpSpPr>
+        <a:xfrm>
+          <a:off x="0" y="0"/>
+          <a:ext cx="0" cy="0"/>
+          <a:chOff x="0" y="0"/>
+          <a:chExt cx="0" cy="0"/>
+        </a:xfrm>
+      </p:grpSpPr>
+      <p:sp>
+        <p:nvSpPr>
+          <p:cNvPr id="4" name="Título 3">
+            <a:extLst>
+              <a:ext uri="{FF2B5EF4-FFF2-40B4-BE49-F238E27FC236}">
+                <a16:creationId xmlns:a16="http://schemas.microsoft.com/office/drawing/2014/main" id="{A76ADAD4-5D80-4F33-8625-531BBECE2757}"/>
+              </a:ext>
+            </a:extLst>
+          </p:cNvPr>
+          <p:cNvSpPr>
+            <a:spLocks noGrp="1"/>
+          </p:cNvSpPr>
+          <p:nvPr>
+            <p:ph type="title"/>
+          </p:nvPr>
+        </p:nvSpPr>
+        <p:spPr/>
+        <p:txBody>
+          <a:bodyPr/>
+          <a:lstStyle/>
+          <a:p>
+            <a:r>
+              <a:rPr lang="es-CL" dirty="0"/>
+              <a:t>Temas</a:t>
+            </a:r>
+          </a:p>
+        </p:txBody>
+      </p:sp>
+      <p:sp>
+        <p:nvSpPr>
+          <p:cNvPr id="5" name="Marcador de texto 4">
+            <a:extLst>
+              <a:ext uri="{FF2B5EF4-FFF2-40B4-BE49-F238E27FC236}">
+                <a16:creationId xmlns:a16="http://schemas.microsoft.com/office/drawing/2014/main" id="{94D89376-36CD-4BC7-AB13-90C663D69DDC}"/>
+              </a:ext>
+            </a:extLst>
+          </p:cNvPr>
+          <p:cNvSpPr>
+            <a:spLocks noGrp="1"/>
+          </p:cNvSpPr>
+          <p:nvPr>
+            <p:ph type="body" idx="1"/>
+          </p:nvPr>
+        </p:nvSpPr>
+        <p:spPr/>
+        <p:txBody>
+          <a:bodyPr/>
+          <a:lstStyle/>
+          <a:p>
+            <a:r>
+              <a:rPr lang="es-CL" dirty="0"/>
+              <a:t>Top productos comprados por clientes.</a:t>
+            </a:r>
+          </a:p>
+          <a:p>
+            <a:r>
+              <a:rPr lang="es-CL" dirty="0"/>
+              <a:t>Horarios y días de mayor demanda.</a:t>
+            </a:r>
+          </a:p>
+          <a:p>
+            <a:r>
+              <a:rPr lang="es-CL" dirty="0"/>
+              <a:t>Segmentación RFM de clientes.</a:t>
+            </a:r>
+          </a:p>
+          <a:p>
+            <a:r>
+              <a:rPr lang="es-CL" dirty="0"/>
+              <a:t>Agrupamiento de clientes.</a:t>
+            </a:r>
+          </a:p>
+          <a:p>
+            <a:r>
+              <a:rPr lang="es-CL" dirty="0"/>
+              <a:t>Días, meses y semanas de mayor compra.</a:t>
+            </a:r>
+          </a:p>
+          <a:p>
+            <a:r>
+              <a:rPr lang="es-CL" dirty="0"/>
+              <a:t>Compras respecto a devoluciones</a:t>
+            </a:r>
+          </a:p>
+          <a:p>
+            <a:r>
+              <a:rPr lang="es-CL" dirty="0"/>
+              <a:t>Top productos con mayor cantidad de devoluciones</a:t>
+            </a:r>
+          </a:p>
+          <a:p>
+            <a:r>
+              <a:rPr lang="es-CL" dirty="0"/>
+              <a:t>Estrategia de venta planteada para los usuarios</a:t>
+            </a:r>
+          </a:p>
+        </p:txBody>
+      </p:sp>
+    </p:spTree>
+    <p:extLst>
+      <p:ext uri="{BB962C8B-B14F-4D97-AF65-F5344CB8AC3E}">
+        <p14:creationId xmlns:p14="http://schemas.microsoft.com/office/powerpoint/2010/main" val="1429307287"/>
+      </p:ext>
+    </p:extLst>
+  </p:cSld>
+  <p:clrMapOvr>
+    <a:masterClrMapping/>
+  </p:clrMapOvr>
+</p:sld>
+</file>
+
+<file path=ppt/slides/slide30.xml><?xml version="1.0" encoding="utf-8"?>
+<p:sld xmlns:a="http://schemas.openxmlformats.org/drawingml/2006/main" xmlns:r="http://schemas.openxmlformats.org/officeDocument/2006/relationships" xmlns:p="http://schemas.openxmlformats.org/presentationml/2006/main">
+  <p:cSld>
+    <p:spTree>
+      <p:nvGrpSpPr>
+        <p:cNvPr id="1" name=""/>
+        <p:cNvGrpSpPr/>
+        <p:nvPr/>
+      </p:nvGrpSpPr>
+      <p:grpSpPr>
+        <a:xfrm>
+          <a:off x="0" y="0"/>
+          <a:ext cx="0" cy="0"/>
+          <a:chOff x="0" y="0"/>
+          <a:chExt cx="0" cy="0"/>
+        </a:xfrm>
+      </p:grpSpPr>
+      <p:sp>
+        <p:nvSpPr>
+          <p:cNvPr id="2" name="Título 1">
+            <a:extLst>
+              <a:ext uri="{FF2B5EF4-FFF2-40B4-BE49-F238E27FC236}">
+                <a16:creationId xmlns:a16="http://schemas.microsoft.com/office/drawing/2014/main" id="{D7B7A0BB-47BB-482D-AD33-78E8B81B8430}"/>
+              </a:ext>
+            </a:extLst>
+          </p:cNvPr>
+          <p:cNvSpPr>
+            <a:spLocks noGrp="1"/>
+          </p:cNvSpPr>
+          <p:nvPr>
+            <p:ph type="title"/>
+          </p:nvPr>
+        </p:nvSpPr>
+        <p:spPr/>
+        <p:txBody>
+          <a:bodyPr/>
+          <a:lstStyle/>
+          <a:p>
+            <a:r>
+              <a:rPr lang="es-CL" dirty="0"/>
+              <a:t>Países con más devoluciones</a:t>
+            </a:r>
+          </a:p>
+        </p:txBody>
+      </p:sp>
+      <p:sp>
+        <p:nvSpPr>
+          <p:cNvPr id="3" name="Marcador de texto 2">
+            <a:extLst>
+              <a:ext uri="{FF2B5EF4-FFF2-40B4-BE49-F238E27FC236}">
+                <a16:creationId xmlns:a16="http://schemas.microsoft.com/office/drawing/2014/main" id="{212D144A-E1A1-43FE-B72F-5707FDBA498C}"/>
+              </a:ext>
+            </a:extLst>
+          </p:cNvPr>
+          <p:cNvSpPr>
+            <a:spLocks noGrp="1"/>
+          </p:cNvSpPr>
+          <p:nvPr>
+            <p:ph type="body" idx="1"/>
+          </p:nvPr>
+        </p:nvSpPr>
+        <p:spPr/>
+        <p:txBody>
+          <a:bodyPr/>
+          <a:lstStyle/>
+          <a:p>
+            <a:r>
+              <a:rPr lang="es-CL" b="0" dirty="0">
+                <a:solidFill>
+                  <a:srgbClr val="000000"/>
+                </a:solidFill>
+                <a:effectLst/>
+              </a:rPr>
+              <a:t>Se puede apreciar que el mayor volumen de devoluciones están en el país de Reino Unido.</a:t>
+            </a:r>
+          </a:p>
+          <a:p>
+            <a:r>
+              <a:rPr lang="es-CL" b="0" dirty="0">
+                <a:solidFill>
+                  <a:srgbClr val="000000"/>
+                </a:solidFill>
+                <a:effectLst/>
+              </a:rPr>
+              <a:t>Omitiendo ese país (ya que es la sede de la comercializadora), se puede apreciar que Alemania concentra un gran volumen de productos devueltos, por lo que sería bueno analizar qué productos son y ver el motivo de la devolución, para realizar un análisis similar al anterior.</a:t>
+            </a:r>
+            <a:endParaRPr lang="es-CL" dirty="0"/>
+          </a:p>
+        </p:txBody>
+      </p:sp>
+    </p:spTree>
+    <p:extLst>
+      <p:ext uri="{BB962C8B-B14F-4D97-AF65-F5344CB8AC3E}">
+        <p14:creationId xmlns:p14="http://schemas.microsoft.com/office/powerpoint/2010/main" val="2841916447"/>
+      </p:ext>
+    </p:extLst>
+  </p:cSld>
+  <p:clrMapOvr>
+    <a:masterClrMapping/>
+  </p:clrMapOvr>
+</p:sld>
+</file>
+
+<file path=ppt/slides/slide31.xml><?xml version="1.0" encoding="utf-8"?>
 <p:sld xmlns:a="http://schemas.openxmlformats.org/drawingml/2006/main" xmlns:r="http://schemas.openxmlformats.org/officeDocument/2006/relationships" xmlns:p="http://schemas.openxmlformats.org/presentationml/2006/main">
   <p:cSld>
     <p:spTree>
@@ -12534,7 +13486,7 @@
 </p:sld>
 </file>
 
-<file path=ppt/slides/slide25.xml><?xml version="1.0" encoding="utf-8"?>
+<file path=ppt/slides/slide32.xml><?xml version="1.0" encoding="utf-8"?>
 <p:sld xmlns:a="http://schemas.openxmlformats.org/drawingml/2006/main" xmlns:r="http://schemas.openxmlformats.org/officeDocument/2006/relationships" xmlns:p="http://schemas.openxmlformats.org/presentationml/2006/main">
   <p:cSld>
     <p:spTree>
@@ -12632,7 +13584,7 @@
 </p:sld>
 </file>
 
-<file path=ppt/slides/slide26.xml><?xml version="1.0" encoding="utf-8"?>
+<file path=ppt/slides/slide33.xml><?xml version="1.0" encoding="utf-8"?>
 <p:sld xmlns:a="http://schemas.openxmlformats.org/drawingml/2006/main" xmlns:r="http://schemas.openxmlformats.org/officeDocument/2006/relationships" xmlns:p="http://schemas.openxmlformats.org/presentationml/2006/main">
   <p:cSld>
     <p:spTree>
@@ -12706,7 +13658,7 @@
           <a:p>
             <a:r>
               <a:rPr lang="es-CL" dirty="0"/>
-              <a:t>Entre los primeros 10 días del mes, en el tramo horario de las 10:00 hrs. a las 15:00 hrs. se podría enviar ofertas de los productos que más consume esta clase de clientes.</a:t>
+              <a:t>Entre los primeros 10 días del mes con énfasis en el día jueves y miércoles, en el tramo horario de las 10:00 hrs. a las 15:00 hrs. se podría enviar ofertas de los productos que más consume esta clase de clientes.</a:t>
             </a:r>
           </a:p>
         </p:txBody>
@@ -12724,7 +13676,7 @@
 </p:sld>
 </file>
 
-<file path=ppt/slides/slide27.xml><?xml version="1.0" encoding="utf-8"?>
+<file path=ppt/slides/slide34.xml><?xml version="1.0" encoding="utf-8"?>
 <p:sld xmlns:a="http://schemas.openxmlformats.org/drawingml/2006/main" xmlns:r="http://schemas.openxmlformats.org/officeDocument/2006/relationships" xmlns:p="http://schemas.openxmlformats.org/presentationml/2006/main">
   <p:cSld>
     <p:spTree>
@@ -12830,7 +13782,118 @@
 </p:sld>
 </file>
 
-<file path=ppt/slides/slide28.xml><?xml version="1.0" encoding="utf-8"?>
+<file path=ppt/slides/slide35.xml><?xml version="1.0" encoding="utf-8"?>
+<p:sld xmlns:a="http://schemas.openxmlformats.org/drawingml/2006/main" xmlns:r="http://schemas.openxmlformats.org/officeDocument/2006/relationships" xmlns:p="http://schemas.openxmlformats.org/presentationml/2006/main">
+  <p:cSld>
+    <p:spTree>
+      <p:nvGrpSpPr>
+        <p:cNvPr id="1" name=""/>
+        <p:cNvGrpSpPr/>
+        <p:nvPr/>
+      </p:nvGrpSpPr>
+      <p:grpSpPr>
+        <a:xfrm>
+          <a:off x="0" y="0"/>
+          <a:ext cx="0" cy="0"/>
+          <a:chOff x="0" y="0"/>
+          <a:chExt cx="0" cy="0"/>
+        </a:xfrm>
+      </p:grpSpPr>
+      <p:sp>
+        <p:nvSpPr>
+          <p:cNvPr id="2" name="Título 1">
+            <a:extLst>
+              <a:ext uri="{FF2B5EF4-FFF2-40B4-BE49-F238E27FC236}">
+                <a16:creationId xmlns:a16="http://schemas.microsoft.com/office/drawing/2014/main" id="{C6113591-CFE4-4DD0-A0D1-802C3939F421}"/>
+              </a:ext>
+            </a:extLst>
+          </p:cNvPr>
+          <p:cNvSpPr>
+            <a:spLocks noGrp="1"/>
+          </p:cNvSpPr>
+          <p:nvPr>
+            <p:ph type="title"/>
+          </p:nvPr>
+        </p:nvSpPr>
+        <p:spPr/>
+        <p:txBody>
+          <a:bodyPr/>
+          <a:lstStyle/>
+          <a:p>
+            <a:r>
+              <a:rPr lang="es-CL" dirty="0"/>
+              <a:t>Productos de clientes de baja frecuencia </a:t>
+            </a:r>
+          </a:p>
+        </p:txBody>
+      </p:sp>
+      <p:sp>
+        <p:nvSpPr>
+          <p:cNvPr id="3" name="Marcador de texto 2">
+            <a:extLst>
+              <a:ext uri="{FF2B5EF4-FFF2-40B4-BE49-F238E27FC236}">
+                <a16:creationId xmlns:a16="http://schemas.microsoft.com/office/drawing/2014/main" id="{CAA53D07-40E8-47C9-BEFA-FB2A82D52FF5}"/>
+              </a:ext>
+            </a:extLst>
+          </p:cNvPr>
+          <p:cNvSpPr>
+            <a:spLocks noGrp="1"/>
+          </p:cNvSpPr>
+          <p:nvPr>
+            <p:ph type="body" idx="1"/>
+          </p:nvPr>
+        </p:nvSpPr>
+        <p:spPr/>
+        <p:txBody>
+          <a:bodyPr/>
+          <a:lstStyle/>
+          <a:p>
+            <a:r>
+              <a:rPr lang="es-CL" b="0" dirty="0">
+                <a:solidFill>
+                  <a:srgbClr val="000000"/>
+                </a:solidFill>
+                <a:effectLst/>
+              </a:rPr>
+              <a:t>La cantidad de compras por productos de esta categoría de clientes da un indicio relacionado a que, a pesar de ser poco frecuentes, realizan una cantidad "relevante" de compras. </a:t>
+            </a:r>
+          </a:p>
+          <a:p>
+            <a:r>
+              <a:rPr lang="es-CL" dirty="0">
+                <a:solidFill>
+                  <a:srgbClr val="000000"/>
+                </a:solidFill>
+              </a:rPr>
+              <a:t>A</a:t>
+            </a:r>
+            <a:r>
+              <a:rPr lang="es-CL" b="0" dirty="0">
+                <a:solidFill>
+                  <a:srgbClr val="000000"/>
+                </a:solidFill>
+                <a:effectLst/>
+              </a:rPr>
+              <a:t>quellos clientes que estén más cerca de la frontera para pasar a ser clientes de "frecuencia promedio" se podrían convencer fácilmente mediante ofertas o descuentos de compras en base a sus productos más comprados.</a:t>
+            </a:r>
+            <a:endParaRPr lang="es-CL" dirty="0"/>
+          </a:p>
+        </p:txBody>
+      </p:sp>
+    </p:spTree>
+    <p:extLst>
+      <p:ext uri="{BB962C8B-B14F-4D97-AF65-F5344CB8AC3E}">
+        <p14:creationId xmlns:p14="http://schemas.microsoft.com/office/powerpoint/2010/main" val="2549212162"/>
+      </p:ext>
+    </p:extLst>
+  </p:cSld>
+  <p:clrMapOvr>
+    <a:masterClrMapping/>
+  </p:clrMapOvr>
+</p:sld>
+</file>
+
+<file path=ppt/slides/slide36.xml><?xml version="1.0" encoding="utf-8"?>
 <p:sld xmlns:a="http://schemas.openxmlformats.org/drawingml/2006/main" xmlns:r="http://schemas.openxmlformats.org/officeDocument/2006/relationships" xmlns:p="http://schemas.openxmlformats.org/presentationml/2006/main">
   <p:cSld>
     <p:spTree>
@@ -12928,7 +13991,7 @@
 </p:sld>
 </file>
 
-<file path=ppt/slides/slide3.xml><?xml version="1.0" encoding="utf-8"?>
+<file path=ppt/slides/slide37.xml><?xml version="1.0" encoding="utf-8"?>
 <p:sld xmlns:a="http://schemas.openxmlformats.org/drawingml/2006/main" xmlns:r="http://schemas.openxmlformats.org/officeDocument/2006/relationships" xmlns:p="http://schemas.openxmlformats.org/presentationml/2006/main">
   <p:cSld>
     <p:spTree>
@@ -12947,10 +14010,10 @@
       </p:grpSpPr>
       <p:sp>
         <p:nvSpPr>
-          <p:cNvPr id="4" name="Título 3">
+          <p:cNvPr id="2" name="Título 1">
             <a:extLst>
               <a:ext uri="{FF2B5EF4-FFF2-40B4-BE49-F238E27FC236}">
-                <a16:creationId xmlns:a16="http://schemas.microsoft.com/office/drawing/2014/main" id="{A76ADAD4-5D80-4F33-8625-531BBECE2757}"/>
+                <a16:creationId xmlns:a16="http://schemas.microsoft.com/office/drawing/2014/main" id="{46728906-A734-4B41-A211-490E814F65C6}"/>
               </a:ext>
             </a:extLst>
           </p:cNvPr>
@@ -12968,17 +14031,17 @@
           <a:p>
             <a:r>
               <a:rPr lang="es-CL" dirty="0"/>
-              <a:t>Temas</a:t>
+              <a:t>Productos de clientes de frecuencia promedio</a:t>
             </a:r>
           </a:p>
         </p:txBody>
       </p:sp>
       <p:sp>
         <p:nvSpPr>
-          <p:cNvPr id="5" name="Marcador de texto 4">
+          <p:cNvPr id="3" name="Marcador de texto 2">
             <a:extLst>
               <a:ext uri="{FF2B5EF4-FFF2-40B4-BE49-F238E27FC236}">
-                <a16:creationId xmlns:a16="http://schemas.microsoft.com/office/drawing/2014/main" id="{94D89376-36CD-4BC7-AB13-90C663D69DDC}"/>
+                <a16:creationId xmlns:a16="http://schemas.microsoft.com/office/drawing/2014/main" id="{5968BCA2-1045-4C7D-9627-81E5B6BCA30A}"/>
               </a:ext>
             </a:extLst>
           </p:cNvPr>
@@ -12995,58 +14058,126 @@
           <a:lstStyle/>
           <a:p>
             <a:r>
-              <a:rPr lang="es-CL" dirty="0"/>
-              <a:t>Top productos comprados por clientes.</a:t>
+              <a:rPr lang="es-CL" b="0" dirty="0">
+                <a:solidFill>
+                  <a:srgbClr val="000000"/>
+                </a:solidFill>
+                <a:effectLst/>
+                <a:latin typeface="Helvetica Neue"/>
+              </a:rPr>
+              <a:t>Al ser el grupo promedio, se puede apreciar que la cantidad de compras por producto es muy elevada comparándola con el cluster de los clientes más frecuentes. </a:t>
             </a:r>
           </a:p>
           <a:p>
             <a:r>
-              <a:rPr lang="es-CL" dirty="0"/>
-              <a:t>Horarios y días de mayor demanda.</a:t>
+              <a:rPr lang="es-CL" b="0" dirty="0">
+                <a:solidFill>
+                  <a:srgbClr val="000000"/>
+                </a:solidFill>
+                <a:effectLst/>
+                <a:latin typeface="Helvetica Neue"/>
+              </a:rPr>
+              <a:t>Este tipo de cliente se podría convencer "fácilmente" para que pueda pasar a la categoría de "clientes frecuentes".</a:t>
             </a:r>
-          </a:p>
-          <a:p>
-            <a:r>
-              <a:rPr lang="es-CL" dirty="0"/>
-              <a:t>Segmentación RFM de clientes.</a:t>
-            </a:r>
-          </a:p>
-          <a:p>
-            <a:r>
-              <a:rPr lang="es-CL" dirty="0"/>
-              <a:t>Agrupamiento de clientes.</a:t>
-            </a:r>
-          </a:p>
-          <a:p>
-            <a:r>
-              <a:rPr lang="es-CL" dirty="0"/>
-              <a:t>Días, meses y semanas de mayor compra.</a:t>
-            </a:r>
-          </a:p>
-          <a:p>
-            <a:r>
-              <a:rPr lang="es-CL" dirty="0"/>
-              <a:t>Compras respecto a devoluciones</a:t>
-            </a:r>
-          </a:p>
-          <a:p>
-            <a:r>
-              <a:rPr lang="es-CL" dirty="0"/>
-              <a:t>Top productos con mayor cantidad de devoluciones</a:t>
-            </a:r>
-          </a:p>
-          <a:p>
-            <a:r>
-              <a:rPr lang="es-CL" dirty="0"/>
-              <a:t>Estrategia de venta planteada para los usuarios</a:t>
-            </a:r>
+            <a:endParaRPr lang="es-CL" dirty="0"/>
           </a:p>
         </p:txBody>
       </p:sp>
     </p:spTree>
     <p:extLst>
       <p:ext uri="{BB962C8B-B14F-4D97-AF65-F5344CB8AC3E}">
-        <p14:creationId xmlns:p14="http://schemas.microsoft.com/office/powerpoint/2010/main" val="1429307287"/>
+        <p14:creationId xmlns:p14="http://schemas.microsoft.com/office/powerpoint/2010/main" val="61265392"/>
+      </p:ext>
+    </p:extLst>
+  </p:cSld>
+  <p:clrMapOvr>
+    <a:masterClrMapping/>
+  </p:clrMapOvr>
+</p:sld>
+</file>
+
+<file path=ppt/slides/slide38.xml><?xml version="1.0" encoding="utf-8"?>
+<p:sld xmlns:a="http://schemas.openxmlformats.org/drawingml/2006/main" xmlns:r="http://schemas.openxmlformats.org/officeDocument/2006/relationships" xmlns:p="http://schemas.openxmlformats.org/presentationml/2006/main">
+  <p:cSld>
+    <p:spTree>
+      <p:nvGrpSpPr>
+        <p:cNvPr id="1" name=""/>
+        <p:cNvGrpSpPr/>
+        <p:nvPr/>
+      </p:nvGrpSpPr>
+      <p:grpSpPr>
+        <a:xfrm>
+          <a:off x="0" y="0"/>
+          <a:ext cx="0" cy="0"/>
+          <a:chOff x="0" y="0"/>
+          <a:chExt cx="0" cy="0"/>
+        </a:xfrm>
+      </p:grpSpPr>
+      <p:sp>
+        <p:nvSpPr>
+          <p:cNvPr id="2" name="Título 1">
+            <a:extLst>
+              <a:ext uri="{FF2B5EF4-FFF2-40B4-BE49-F238E27FC236}">
+                <a16:creationId xmlns:a16="http://schemas.microsoft.com/office/drawing/2014/main" id="{E2B17AF2-6254-4EE4-B18F-5523E100F497}"/>
+              </a:ext>
+            </a:extLst>
+          </p:cNvPr>
+          <p:cNvSpPr>
+            <a:spLocks noGrp="1"/>
+          </p:cNvSpPr>
+          <p:nvPr>
+            <p:ph type="ctrTitle"/>
+          </p:nvPr>
+        </p:nvSpPr>
+        <p:spPr/>
+        <p:txBody>
+          <a:bodyPr/>
+          <a:lstStyle/>
+          <a:p>
+            <a:r>
+              <a:rPr lang="es-CL" dirty="0"/>
+              <a:t>Online </a:t>
+            </a:r>
+            <a:r>
+              <a:rPr lang="es-CL" dirty="0" err="1"/>
+              <a:t>retail</a:t>
+            </a:r>
+            <a:endParaRPr lang="es-CL" dirty="0"/>
+          </a:p>
+        </p:txBody>
+      </p:sp>
+      <p:sp>
+        <p:nvSpPr>
+          <p:cNvPr id="3" name="Subtítulo 2">
+            <a:extLst>
+              <a:ext uri="{FF2B5EF4-FFF2-40B4-BE49-F238E27FC236}">
+                <a16:creationId xmlns:a16="http://schemas.microsoft.com/office/drawing/2014/main" id="{90C09C55-37AE-47BA-A841-E5301508766E}"/>
+              </a:ext>
+            </a:extLst>
+          </p:cNvPr>
+          <p:cNvSpPr>
+            <a:spLocks noGrp="1"/>
+          </p:cNvSpPr>
+          <p:nvPr>
+            <p:ph type="subTitle" idx="1"/>
+          </p:nvPr>
+        </p:nvSpPr>
+        <p:spPr/>
+        <p:txBody>
+          <a:bodyPr/>
+          <a:lstStyle/>
+          <a:p>
+            <a:r>
+              <a:rPr lang="es-CL" dirty="0"/>
+              <a:t>Cristóbal Saldías Rojas</a:t>
+            </a:r>
+          </a:p>
+        </p:txBody>
+      </p:sp>
+    </p:spTree>
+    <p:extLst>
+      <p:ext uri="{BB962C8B-B14F-4D97-AF65-F5344CB8AC3E}">
+        <p14:creationId xmlns:p14="http://schemas.microsoft.com/office/powerpoint/2010/main" val="3959558598"/>
       </p:ext>
     </p:extLst>
   </p:cSld>
@@ -13350,6 +14481,98 @@
 </file>
 
 <file path=ppt/slides/slide6.xml><?xml version="1.0" encoding="utf-8"?>
+<p:sld xmlns:a="http://schemas.openxmlformats.org/drawingml/2006/main" xmlns:r="http://schemas.openxmlformats.org/officeDocument/2006/relationships" xmlns:p="http://schemas.openxmlformats.org/presentationml/2006/main">
+  <p:cSld>
+    <p:spTree>
+      <p:nvGrpSpPr>
+        <p:cNvPr id="1" name=""/>
+        <p:cNvGrpSpPr/>
+        <p:nvPr/>
+      </p:nvGrpSpPr>
+      <p:grpSpPr>
+        <a:xfrm>
+          <a:off x="0" y="0"/>
+          <a:ext cx="0" cy="0"/>
+          <a:chOff x="0" y="0"/>
+          <a:chExt cx="0" cy="0"/>
+        </a:xfrm>
+      </p:grpSpPr>
+      <p:sp>
+        <p:nvSpPr>
+          <p:cNvPr id="3" name="Título 2">
+            <a:extLst>
+              <a:ext uri="{FF2B5EF4-FFF2-40B4-BE49-F238E27FC236}">
+                <a16:creationId xmlns:a16="http://schemas.microsoft.com/office/drawing/2014/main" id="{1F633A94-E201-48D8-AFE6-FBCAB315920A}"/>
+              </a:ext>
+            </a:extLst>
+          </p:cNvPr>
+          <p:cNvSpPr>
+            <a:spLocks noGrp="1"/>
+          </p:cNvSpPr>
+          <p:nvPr>
+            <p:ph type="title"/>
+          </p:nvPr>
+        </p:nvSpPr>
+        <p:spPr/>
+        <p:txBody>
+          <a:bodyPr/>
+          <a:lstStyle/>
+          <a:p>
+            <a:r>
+              <a:rPr lang="es-CL" dirty="0"/>
+              <a:t>Productos más comprados</a:t>
+            </a:r>
+          </a:p>
+        </p:txBody>
+      </p:sp>
+      <p:sp>
+        <p:nvSpPr>
+          <p:cNvPr id="4" name="Marcador de texto 3">
+            <a:extLst>
+              <a:ext uri="{FF2B5EF4-FFF2-40B4-BE49-F238E27FC236}">
+                <a16:creationId xmlns:a16="http://schemas.microsoft.com/office/drawing/2014/main" id="{659DBE77-DFF6-4781-9F44-5622D032C69A}"/>
+              </a:ext>
+            </a:extLst>
+          </p:cNvPr>
+          <p:cNvSpPr>
+            <a:spLocks noGrp="1"/>
+          </p:cNvSpPr>
+          <p:nvPr>
+            <p:ph type="body" idx="1"/>
+          </p:nvPr>
+        </p:nvSpPr>
+        <p:spPr/>
+        <p:txBody>
+          <a:bodyPr/>
+          <a:lstStyle/>
+          <a:p>
+            <a:r>
+              <a:rPr lang="es-CL" dirty="0">
+                <a:solidFill>
+                  <a:srgbClr val="000000"/>
+                </a:solidFill>
+                <a:effectLst/>
+              </a:rPr>
+              <a:t>Este gráfico, permite reconocer los productos con mayor probabilidad de ser vendidos, por lo que se podría elaborar una estrategia de ofertas y marketing generalizada en base a estos productos sin la necesidad de segmentar a los clientes de forma específica.</a:t>
+            </a:r>
+            <a:endParaRPr lang="es-CL" dirty="0"/>
+          </a:p>
+        </p:txBody>
+      </p:sp>
+    </p:spTree>
+    <p:extLst>
+      <p:ext uri="{BB962C8B-B14F-4D97-AF65-F5344CB8AC3E}">
+        <p14:creationId xmlns:p14="http://schemas.microsoft.com/office/powerpoint/2010/main" val="2621195374"/>
+      </p:ext>
+    </p:extLst>
+  </p:cSld>
+  <p:clrMapOvr>
+    <a:masterClrMapping/>
+  </p:clrMapOvr>
+</p:sld>
+</file>
+
+<file path=ppt/slides/slide7.xml><?xml version="1.0" encoding="utf-8"?>
 <p:sld xmlns:a="http://schemas.openxmlformats.org/drawingml/2006/main" xmlns:r="http://schemas.openxmlformats.org/officeDocument/2006/relationships" xmlns:p="http://schemas.openxmlformats.org/presentationml/2006/main">
   <p:cSld>
     <p:spTree>
@@ -14021,7 +15244,7 @@
 </p:sld>
 </file>
 
-<file path=ppt/slides/slide7.xml><?xml version="1.0" encoding="utf-8"?>
+<file path=ppt/slides/slide8.xml><?xml version="1.0" encoding="utf-8"?>
 <p:sld xmlns:a="http://schemas.openxmlformats.org/drawingml/2006/main" xmlns:r="http://schemas.openxmlformats.org/officeDocument/2006/relationships" xmlns:p="http://schemas.openxmlformats.org/presentationml/2006/main">
   <p:cSld>
     <p:spTree>
@@ -14095,15 +15318,7 @@
           <a:p>
             <a:r>
               <a:rPr lang="es-CL" dirty="0"/>
-              <a:t>Con respecto a los días con mayor demanda, estos se ubican en los primeros días, siendo el </a:t>
-            </a:r>
-            <a:r>
-              <a:rPr lang="es-CL" dirty="0" err="1"/>
-              <a:t>peak</a:t>
-            </a:r>
-            <a:r>
-              <a:rPr lang="es-CL" dirty="0"/>
-              <a:t> de compras el día 8 del mes. Después de este, se ve un leve ascenso para el día 20 del mes.</a:t>
+              <a:t>Con respecto a los días con mayor demanda, estos se ubican en los primeros días, siendo el peak de compras el día 8 del mes. Después de este, se ve un leve ascenso para el día 20 del mes.</a:t>
             </a:r>
           </a:p>
         </p:txBody>
@@ -14121,7 +15336,7 @@
 </p:sld>
 </file>
 
-<file path=ppt/slides/slide8.xml><?xml version="1.0" encoding="utf-8"?>
+<file path=ppt/slides/slide9.xml><?xml version="1.0" encoding="utf-8"?>
 <p:sld xmlns:a="http://schemas.openxmlformats.org/drawingml/2006/main" xmlns:r="http://schemas.openxmlformats.org/officeDocument/2006/relationships" xmlns:p="http://schemas.openxmlformats.org/presentationml/2006/main">
   <p:cSld>
     <p:spTree>
@@ -14170,128 +15385,6 @@
     <p:extLst>
       <p:ext uri="{BB962C8B-B14F-4D97-AF65-F5344CB8AC3E}">
         <p14:creationId xmlns:p14="http://schemas.microsoft.com/office/powerpoint/2010/main" val="3097155922"/>
-      </p:ext>
-    </p:extLst>
-  </p:cSld>
-  <p:clrMapOvr>
-    <a:masterClrMapping/>
-  </p:clrMapOvr>
-</p:sld>
-</file>
-
-<file path=ppt/slides/slide9.xml><?xml version="1.0" encoding="utf-8"?>
-<p:sld xmlns:a="http://schemas.openxmlformats.org/drawingml/2006/main" xmlns:r="http://schemas.openxmlformats.org/officeDocument/2006/relationships" xmlns:p="http://schemas.openxmlformats.org/presentationml/2006/main">
-  <p:cSld>
-    <p:spTree>
-      <p:nvGrpSpPr>
-        <p:cNvPr id="1" name=""/>
-        <p:cNvGrpSpPr/>
-        <p:nvPr/>
-      </p:nvGrpSpPr>
-      <p:grpSpPr>
-        <a:xfrm>
-          <a:off x="0" y="0"/>
-          <a:ext cx="0" cy="0"/>
-          <a:chOff x="0" y="0"/>
-          <a:chExt cx="0" cy="0"/>
-        </a:xfrm>
-      </p:grpSpPr>
-      <p:sp>
-        <p:nvSpPr>
-          <p:cNvPr id="2" name="Título 1">
-            <a:extLst>
-              <a:ext uri="{FF2B5EF4-FFF2-40B4-BE49-F238E27FC236}">
-                <a16:creationId xmlns:a16="http://schemas.microsoft.com/office/drawing/2014/main" id="{090112C1-E192-4965-B37D-8B02D3777E1D}"/>
-              </a:ext>
-            </a:extLst>
-          </p:cNvPr>
-          <p:cNvSpPr>
-            <a:spLocks noGrp="1"/>
-          </p:cNvSpPr>
-          <p:nvPr>
-            <p:ph type="title"/>
-          </p:nvPr>
-        </p:nvSpPr>
-        <p:spPr/>
-        <p:txBody>
-          <a:bodyPr/>
-          <a:lstStyle/>
-          <a:p>
-            <a:r>
-              <a:rPr lang="es-CL" dirty="0"/>
-              <a:t>RFM</a:t>
-            </a:r>
-          </a:p>
-        </p:txBody>
-      </p:sp>
-      <p:sp>
-        <p:nvSpPr>
-          <p:cNvPr id="3" name="Marcador de contenido 2">
-            <a:extLst>
-              <a:ext uri="{FF2B5EF4-FFF2-40B4-BE49-F238E27FC236}">
-                <a16:creationId xmlns:a16="http://schemas.microsoft.com/office/drawing/2014/main" id="{CE837E54-5849-4135-9811-99364256D384}"/>
-              </a:ext>
-            </a:extLst>
-          </p:cNvPr>
-          <p:cNvSpPr>
-            <a:spLocks noGrp="1"/>
-          </p:cNvSpPr>
-          <p:nvPr>
-            <p:ph type="body" idx="1"/>
-          </p:nvPr>
-        </p:nvSpPr>
-        <p:spPr/>
-        <p:txBody>
-          <a:bodyPr/>
-          <a:lstStyle/>
-          <a:p>
-            <a:r>
-              <a:rPr lang="es-CL" sz="2400" dirty="0"/>
-              <a:t>Para analizar la frecuencia y recencia de compra, se realizó una segmentación RFM.</a:t>
-            </a:r>
-          </a:p>
-          <a:p>
-            <a:r>
-              <a:rPr lang="es-CL" sz="2400" dirty="0"/>
-              <a:t>Su nombre proviene de sus siglas en inglés:</a:t>
-            </a:r>
-          </a:p>
-          <a:p>
-            <a:pPr lvl="1"/>
-            <a:r>
-              <a:rPr lang="es-CL" sz="1800" dirty="0" err="1"/>
-              <a:t>Recency</a:t>
-            </a:r>
-            <a:endParaRPr lang="es-CL" sz="1800" dirty="0"/>
-          </a:p>
-          <a:p>
-            <a:pPr lvl="1"/>
-            <a:r>
-              <a:rPr lang="es-CL" sz="1800" dirty="0" err="1"/>
-              <a:t>Frecuency</a:t>
-            </a:r>
-            <a:endParaRPr lang="es-CL" sz="1800" dirty="0"/>
-          </a:p>
-          <a:p>
-            <a:pPr lvl="1"/>
-            <a:r>
-              <a:rPr lang="es-CL" sz="1800" dirty="0" err="1"/>
-              <a:t>Monetary</a:t>
-            </a:r>
-            <a:endParaRPr lang="es-CL" sz="1800" dirty="0"/>
-          </a:p>
-          <a:p>
-            <a:r>
-              <a:rPr lang="es-CL" sz="2400" dirty="0"/>
-              <a:t>Se basa en que, el 80% de los ingresos proviene del 20% de los clientes.</a:t>
-            </a:r>
-          </a:p>
-        </p:txBody>
-      </p:sp>
-    </p:spTree>
-    <p:extLst>
-      <p:ext uri="{BB962C8B-B14F-4D97-AF65-F5344CB8AC3E}">
-        <p14:creationId xmlns:p14="http://schemas.microsoft.com/office/powerpoint/2010/main" val="3930673792"/>
       </p:ext>
     </p:extLst>
   </p:cSld>

</xml_diff>